<commit_message>
final updated before mid
</commit_message>
<xml_diff>
--- a/Chapter 2 & 5-Maint.framework&process.pptx
+++ b/Chapter 2 & 5-Maint.framework&process.pptx
@@ -4,6 +4,9 @@
   <p:sldMasterIdLst>
     <p:sldMasterId id="2147483648" r:id="rId1"/>
   </p:sldMasterIdLst>
+  <p:notesMasterIdLst>
+    <p:notesMasterId r:id="rId31"/>
+  </p:notesMasterIdLst>
   <p:sldIdLst>
     <p:sldId id="256" r:id="rId2"/>
     <p:sldId id="257" r:id="rId3"/>
@@ -35,11 +38,108 @@
     <p:sldId id="283" r:id="rId29"/>
     <p:sldId id="284" r:id="rId30"/>
   </p:sldIdLst>
-  <p:notesMasterIdLst>
-    <p:notesMasterId r:id="rId31"/>
-  </p:notesMasterIdLst>
   <p:sldSz cx="14630400" cy="8229600"/>
   <p:notesSz cx="8229600" cy="14630400"/>
+  <p:defaultTextStyle>
+    <a:defPPr>
+      <a:defRPr lang="en-US"/>
+    </a:defPPr>
+    <a:lvl1pPr marL="0" algn="l" defTabSz="914400" rtl="0" eaLnBrk="1" latinLnBrk="0" hangingPunct="1">
+      <a:defRPr sz="1800" kern="1200">
+        <a:solidFill>
+          <a:schemeClr val="tx1"/>
+        </a:solidFill>
+        <a:latin typeface="+mn-lt"/>
+        <a:ea typeface="+mn-ea"/>
+        <a:cs typeface="+mn-cs"/>
+      </a:defRPr>
+    </a:lvl1pPr>
+    <a:lvl2pPr marL="457200" algn="l" defTabSz="914400" rtl="0" eaLnBrk="1" latinLnBrk="0" hangingPunct="1">
+      <a:defRPr sz="1800" kern="1200">
+        <a:solidFill>
+          <a:schemeClr val="tx1"/>
+        </a:solidFill>
+        <a:latin typeface="+mn-lt"/>
+        <a:ea typeface="+mn-ea"/>
+        <a:cs typeface="+mn-cs"/>
+      </a:defRPr>
+    </a:lvl2pPr>
+    <a:lvl3pPr marL="914400" algn="l" defTabSz="914400" rtl="0" eaLnBrk="1" latinLnBrk="0" hangingPunct="1">
+      <a:defRPr sz="1800" kern="1200">
+        <a:solidFill>
+          <a:schemeClr val="tx1"/>
+        </a:solidFill>
+        <a:latin typeface="+mn-lt"/>
+        <a:ea typeface="+mn-ea"/>
+        <a:cs typeface="+mn-cs"/>
+      </a:defRPr>
+    </a:lvl3pPr>
+    <a:lvl4pPr marL="1371600" algn="l" defTabSz="914400" rtl="0" eaLnBrk="1" latinLnBrk="0" hangingPunct="1">
+      <a:defRPr sz="1800" kern="1200">
+        <a:solidFill>
+          <a:schemeClr val="tx1"/>
+        </a:solidFill>
+        <a:latin typeface="+mn-lt"/>
+        <a:ea typeface="+mn-ea"/>
+        <a:cs typeface="+mn-cs"/>
+      </a:defRPr>
+    </a:lvl4pPr>
+    <a:lvl5pPr marL="1828800" algn="l" defTabSz="914400" rtl="0" eaLnBrk="1" latinLnBrk="0" hangingPunct="1">
+      <a:defRPr sz="1800" kern="1200">
+        <a:solidFill>
+          <a:schemeClr val="tx1"/>
+        </a:solidFill>
+        <a:latin typeface="+mn-lt"/>
+        <a:ea typeface="+mn-ea"/>
+        <a:cs typeface="+mn-cs"/>
+      </a:defRPr>
+    </a:lvl5pPr>
+    <a:lvl6pPr marL="2286000" algn="l" defTabSz="914400" rtl="0" eaLnBrk="1" latinLnBrk="0" hangingPunct="1">
+      <a:defRPr sz="1800" kern="1200">
+        <a:solidFill>
+          <a:schemeClr val="tx1"/>
+        </a:solidFill>
+        <a:latin typeface="+mn-lt"/>
+        <a:ea typeface="+mn-ea"/>
+        <a:cs typeface="+mn-cs"/>
+      </a:defRPr>
+    </a:lvl6pPr>
+    <a:lvl7pPr marL="2743200" algn="l" defTabSz="914400" rtl="0" eaLnBrk="1" latinLnBrk="0" hangingPunct="1">
+      <a:defRPr sz="1800" kern="1200">
+        <a:solidFill>
+          <a:schemeClr val="tx1"/>
+        </a:solidFill>
+        <a:latin typeface="+mn-lt"/>
+        <a:ea typeface="+mn-ea"/>
+        <a:cs typeface="+mn-cs"/>
+      </a:defRPr>
+    </a:lvl7pPr>
+    <a:lvl8pPr marL="3200400" algn="l" defTabSz="914400" rtl="0" eaLnBrk="1" latinLnBrk="0" hangingPunct="1">
+      <a:defRPr sz="1800" kern="1200">
+        <a:solidFill>
+          <a:schemeClr val="tx1"/>
+        </a:solidFill>
+        <a:latin typeface="+mn-lt"/>
+        <a:ea typeface="+mn-ea"/>
+        <a:cs typeface="+mn-cs"/>
+      </a:defRPr>
+    </a:lvl8pPr>
+    <a:lvl9pPr marL="3657600" algn="l" defTabSz="914400" rtl="0" eaLnBrk="1" latinLnBrk="0" hangingPunct="1">
+      <a:defRPr sz="1800" kern="1200">
+        <a:solidFill>
+          <a:schemeClr val="tx1"/>
+        </a:solidFill>
+        <a:latin typeface="+mn-lt"/>
+        <a:ea typeface="+mn-ea"/>
+        <a:cs typeface="+mn-cs"/>
+      </a:defRPr>
+    </a:lvl9pPr>
+  </p:defaultTextStyle>
+  <p:extLst>
+    <p:ext uri="{EFAFB233-063F-42B5-8137-9DF3F51BA10A}">
+      <p15:sldGuideLst xmlns:p15="http://schemas.microsoft.com/office/powerpoint/2012/main"/>
+    </p:ext>
+  </p:extLst>
 </p:presentation>
 </file>
 
@@ -65,234 +165,10 @@
           <a:chExt cx="0" cy="0"/>
         </a:xfrm>
       </p:grpSpPr>
-      <p:sp>
-        <p:nvSpPr>
-          <p:cNvPr id="2" name="Header Placeholder 1"/>
-          <p:cNvSpPr>
-            <a:spLocks noGrp="1"/>
-          </p:cNvSpPr>
-          <p:nvPr>
-            <p:ph type="hdr" sz="quarter"/>
-          </p:nvPr>
-        </p:nvSpPr>
-        <p:spPr>
-          <a:xfrm>
-            <a:off x="0" y="0"/>
-            <a:ext cx="2971800" cy="458788"/>
-          </a:xfrm>
-          <a:prstGeom prst="rect">
-            <a:avLst/>
-          </a:prstGeom>
-        </p:spPr>
-        <p:txBody>
-          <a:bodyPr vert="horz" lIns="91440" tIns="45720" rIns="91440" bIns="45720" rtlCol="0"/>
-          <a:lstStyle>
-            <a:lvl1pPr algn="l">
-              <a:defRPr sz="1200"/>
-            </a:lvl1pPr>
-          </a:lstStyle>
-          <a:p>
-            <a:endParaRPr lang="en-US"/>
-          </a:p>
-        </p:txBody>
-      </p:sp>
-      <p:sp>
-        <p:nvSpPr>
-          <p:cNvPr id="3" name="Date Placeholder 2"/>
-          <p:cNvSpPr>
-            <a:spLocks noGrp="1"/>
-          </p:cNvSpPr>
-          <p:nvPr>
-            <p:ph type="dt" idx="1"/>
-          </p:nvPr>
-        </p:nvSpPr>
-        <p:spPr>
-          <a:xfrm>
-            <a:off x="3884613" y="0"/>
-            <a:ext cx="2971800" cy="458788"/>
-          </a:xfrm>
-          <a:prstGeom prst="rect">
-            <a:avLst/>
-          </a:prstGeom>
-        </p:spPr>
-        <p:txBody>
-          <a:bodyPr vert="horz" lIns="91440" tIns="45720" rIns="91440" bIns="45720" rtlCol="0"/>
-          <a:lstStyle>
-            <a:lvl1pPr algn="r">
-              <a:defRPr sz="1200"/>
-            </a:lvl1pPr>
-          </a:lstStyle>
-          <a:p>
-            <a:fld id="{5282F153-3F37-0F45-9E97-73ACFA13230C}" type="datetimeFigureOut">
-              <a:rPr lang="en-US"/>
-              <a:t>7/23/19</a:t>
-            </a:fld>
-            <a:endParaRPr lang="en-US"/>
-          </a:p>
-        </p:txBody>
-      </p:sp>
-      <p:sp>
-        <p:nvSpPr>
-          <p:cNvPr id="4" name="Slide Image Placeholder 3"/>
-          <p:cNvSpPr>
-            <a:spLocks noGrp="1" noRot="1" noChangeAspect="1"/>
-          </p:cNvSpPr>
-          <p:nvPr>
-            <p:ph type="sldImg" idx="2"/>
-          </p:nvPr>
-        </p:nvSpPr>
-        <p:spPr>
-          <a:xfrm>
-            <a:off x="685800" y="1143000"/>
-            <a:ext cx="5486400" cy="3086100"/>
-          </a:xfrm>
-          <a:prstGeom prst="rect">
-            <a:avLst/>
-          </a:prstGeom>
-          <a:noFill/>
-          <a:ln w="12700">
-            <a:solidFill>
-              <a:prstClr val="black"/>
-            </a:solidFill>
-          </a:ln>
-        </p:spPr>
-        <p:txBody>
-          <a:bodyPr vert="horz" lIns="91440" tIns="45720" rIns="91440" bIns="45720" rtlCol="0" anchor="ctr"/>
-          <a:lstStyle/>
-          <a:p>
-            <a:endParaRPr lang="en-US"/>
-          </a:p>
-        </p:txBody>
-      </p:sp>
-      <p:sp>
-        <p:nvSpPr>
-          <p:cNvPr id="5" name="Notes Placeholder 4"/>
-          <p:cNvSpPr>
-            <a:spLocks noGrp="1"/>
-          </p:cNvSpPr>
-          <p:nvPr>
-            <p:ph type="body" sz="quarter" idx="3"/>
-          </p:nvPr>
-        </p:nvSpPr>
-        <p:spPr>
-          <a:xfrm>
-            <a:off x="685800" y="4400550"/>
-            <a:ext cx="5486400" cy="3600450"/>
-          </a:xfrm>
-          <a:prstGeom prst="rect">
-            <a:avLst/>
-          </a:prstGeom>
-        </p:spPr>
-        <p:txBody>
-          <a:bodyPr vert="horz" lIns="91440" tIns="45720" rIns="91440" bIns="45720" rtlCol="0"/>
-          <a:lstStyle/>
-          <a:p>
-            <a:pPr lvl="0"/>
-            <a:r>
-              <a:rPr lang="en-US"/>
-              <a:t>Click to edit Master text styles</a:t>
-            </a:r>
-          </a:p>
-          <a:p>
-            <a:pPr lvl="1"/>
-            <a:r>
-              <a:rPr lang="en-US"/>
-              <a:t>Second level</a:t>
-            </a:r>
-          </a:p>
-          <a:p>
-            <a:pPr lvl="2"/>
-            <a:r>
-              <a:rPr lang="en-US"/>
-              <a:t>Third level</a:t>
-            </a:r>
-          </a:p>
-          <a:p>
-            <a:pPr lvl="3"/>
-            <a:r>
-              <a:rPr lang="en-US"/>
-              <a:t>Fourth level</a:t>
-            </a:r>
-          </a:p>
-          <a:p>
-            <a:pPr lvl="4"/>
-            <a:r>
-              <a:rPr lang="en-US"/>
-              <a:t>Fifth level</a:t>
-            </a:r>
-          </a:p>
-        </p:txBody>
-      </p:sp>
-      <p:sp>
-        <p:nvSpPr>
-          <p:cNvPr id="6" name="Footer Placeholder 5"/>
-          <p:cNvSpPr>
-            <a:spLocks noGrp="1"/>
-          </p:cNvSpPr>
-          <p:nvPr>
-            <p:ph type="ftr" sz="quarter" idx="4"/>
-          </p:nvPr>
-        </p:nvSpPr>
-        <p:spPr>
-          <a:xfrm>
-            <a:off x="0" y="8685213"/>
-            <a:ext cx="2971800" cy="458787"/>
-          </a:xfrm>
-          <a:prstGeom prst="rect">
-            <a:avLst/>
-          </a:prstGeom>
-        </p:spPr>
-        <p:txBody>
-          <a:bodyPr vert="horz" lIns="91440" tIns="45720" rIns="91440" bIns="45720" rtlCol="0" anchor="b"/>
-          <a:lstStyle>
-            <a:lvl1pPr algn="l">
-              <a:defRPr sz="1200"/>
-            </a:lvl1pPr>
-          </a:lstStyle>
-          <a:p>
-            <a:endParaRPr lang="en-US"/>
-          </a:p>
-        </p:txBody>
-      </p:sp>
-      <p:sp>
-        <p:nvSpPr>
-          <p:cNvPr id="7" name="Slide Number Placeholder 6"/>
-          <p:cNvSpPr>
-            <a:spLocks noGrp="1"/>
-          </p:cNvSpPr>
-          <p:nvPr>
-            <p:ph type="sldNum" sz="quarter" idx="5"/>
-          </p:nvPr>
-        </p:nvSpPr>
-        <p:spPr>
-          <a:xfrm>
-            <a:off x="3884613" y="8685213"/>
-            <a:ext cx="2971800" cy="458787"/>
-          </a:xfrm>
-          <a:prstGeom prst="rect">
-            <a:avLst/>
-          </a:prstGeom>
-        </p:spPr>
-        <p:txBody>
-          <a:bodyPr vert="horz" lIns="91440" tIns="45720" rIns="91440" bIns="45720" rtlCol="0" anchor="b"/>
-          <a:lstStyle>
-            <a:lvl1pPr algn="r">
-              <a:defRPr sz="1200"/>
-            </a:lvl1pPr>
-          </a:lstStyle>
-          <a:p>
-            <a:fld id="{CE5E9CC1-C706-0F49-92D6-E571CC5EEA8F}" type="slidenum">
-              <a:rPr lang="en-US"/>
-              <a:t>‹#›</a:t>
-            </a:fld>
-            <a:endParaRPr lang="en-US"/>
-          </a:p>
-        </p:txBody>
-      </p:sp>
     </p:spTree>
     <p:extLst>
       <p:ext uri="{BB962C8B-B14F-4D97-AF65-F5344CB8AC3E}">
-        <p14:creationId xmlns:p14="http://schemas.microsoft.com/office/powerpoint/2010/main" val="1024086991"/>
+        <p14:creationId xmlns:p14="http://schemas.microsoft.com/office/powerpoint/2010/main" val="3250108377"/>
       </p:ext>
     </p:extLst>
   </p:cSld>
@@ -436,10 +312,6 @@
           <a:bodyPr/>
           <a:lstStyle/>
           <a:p>
-            <a:r>
-              <a:rPr lang="en-US" dirty="0"/>
-              <a:t/>
-            </a:r>
             <a:endParaRPr lang="en-US" dirty="0"/>
           </a:p>
         </p:txBody>
@@ -524,10 +396,6 @@
           <a:bodyPr/>
           <a:lstStyle/>
           <a:p>
-            <a:r>
-              <a:rPr lang="en-US" dirty="0"/>
-              <a:t/>
-            </a:r>
             <a:endParaRPr lang="en-US" dirty="0"/>
           </a:p>
         </p:txBody>
@@ -612,10 +480,6 @@
           <a:bodyPr/>
           <a:lstStyle/>
           <a:p>
-            <a:r>
-              <a:rPr lang="en-US" dirty="0"/>
-              <a:t/>
-            </a:r>
             <a:endParaRPr lang="en-US" dirty="0"/>
           </a:p>
         </p:txBody>
@@ -700,10 +564,6 @@
           <a:bodyPr/>
           <a:lstStyle/>
           <a:p>
-            <a:r>
-              <a:rPr lang="en-US" dirty="0"/>
-              <a:t/>
-            </a:r>
             <a:endParaRPr lang="en-US" dirty="0"/>
           </a:p>
         </p:txBody>
@@ -788,10 +648,6 @@
           <a:bodyPr/>
           <a:lstStyle/>
           <a:p>
-            <a:r>
-              <a:rPr lang="en-US" dirty="0"/>
-              <a:t/>
-            </a:r>
             <a:endParaRPr lang="en-US" dirty="0"/>
           </a:p>
         </p:txBody>
@@ -876,10 +732,6 @@
           <a:bodyPr/>
           <a:lstStyle/>
           <a:p>
-            <a:r>
-              <a:rPr lang="en-US" dirty="0"/>
-              <a:t/>
-            </a:r>
             <a:endParaRPr lang="en-US" dirty="0"/>
           </a:p>
         </p:txBody>
@@ -964,10 +816,6 @@
           <a:bodyPr/>
           <a:lstStyle/>
           <a:p>
-            <a:r>
-              <a:rPr lang="en-US" dirty="0"/>
-              <a:t/>
-            </a:r>
             <a:endParaRPr lang="en-US" dirty="0"/>
           </a:p>
         </p:txBody>
@@ -1052,10 +900,6 @@
           <a:bodyPr/>
           <a:lstStyle/>
           <a:p>
-            <a:r>
-              <a:rPr lang="en-US" dirty="0"/>
-              <a:t/>
-            </a:r>
             <a:endParaRPr lang="en-US" dirty="0"/>
           </a:p>
         </p:txBody>
@@ -1140,10 +984,6 @@
           <a:bodyPr/>
           <a:lstStyle/>
           <a:p>
-            <a:r>
-              <a:rPr lang="en-US" dirty="0"/>
-              <a:t/>
-            </a:r>
             <a:endParaRPr lang="en-US" dirty="0"/>
           </a:p>
         </p:txBody>
@@ -1228,10 +1068,6 @@
           <a:bodyPr/>
           <a:lstStyle/>
           <a:p>
-            <a:r>
-              <a:rPr lang="en-US" dirty="0"/>
-              <a:t/>
-            </a:r>
             <a:endParaRPr lang="en-US" dirty="0"/>
           </a:p>
         </p:txBody>
@@ -1316,10 +1152,6 @@
           <a:bodyPr/>
           <a:lstStyle/>
           <a:p>
-            <a:r>
-              <a:rPr lang="en-US" dirty="0"/>
-              <a:t/>
-            </a:r>
             <a:endParaRPr lang="en-US" dirty="0"/>
           </a:p>
         </p:txBody>
@@ -1404,10 +1236,6 @@
           <a:bodyPr/>
           <a:lstStyle/>
           <a:p>
-            <a:r>
-              <a:rPr lang="en-US" dirty="0"/>
-              <a:t/>
-            </a:r>
             <a:endParaRPr lang="en-US" dirty="0"/>
           </a:p>
         </p:txBody>
@@ -1492,10 +1320,6 @@
           <a:bodyPr/>
           <a:lstStyle/>
           <a:p>
-            <a:r>
-              <a:rPr lang="en-US" dirty="0"/>
-              <a:t/>
-            </a:r>
             <a:endParaRPr lang="en-US" dirty="0"/>
           </a:p>
         </p:txBody>
@@ -1580,10 +1404,6 @@
           <a:bodyPr/>
           <a:lstStyle/>
           <a:p>
-            <a:r>
-              <a:rPr lang="en-US" dirty="0"/>
-              <a:t/>
-            </a:r>
             <a:endParaRPr lang="en-US" dirty="0"/>
           </a:p>
         </p:txBody>
@@ -1668,10 +1488,6 @@
           <a:bodyPr/>
           <a:lstStyle/>
           <a:p>
-            <a:r>
-              <a:rPr lang="en-US" dirty="0"/>
-              <a:t/>
-            </a:r>
             <a:endParaRPr lang="en-US" dirty="0"/>
           </a:p>
         </p:txBody>
@@ -1756,10 +1572,6 @@
           <a:bodyPr/>
           <a:lstStyle/>
           <a:p>
-            <a:r>
-              <a:rPr lang="en-US" dirty="0"/>
-              <a:t/>
-            </a:r>
             <a:endParaRPr lang="en-US" dirty="0"/>
           </a:p>
         </p:txBody>
@@ -1844,10 +1656,6 @@
           <a:bodyPr/>
           <a:lstStyle/>
           <a:p>
-            <a:r>
-              <a:rPr lang="en-US" dirty="0"/>
-              <a:t/>
-            </a:r>
             <a:endParaRPr lang="en-US" dirty="0"/>
           </a:p>
         </p:txBody>
@@ -1932,10 +1740,6 @@
           <a:bodyPr/>
           <a:lstStyle/>
           <a:p>
-            <a:r>
-              <a:rPr lang="en-US" dirty="0"/>
-              <a:t/>
-            </a:r>
             <a:endParaRPr lang="en-US" dirty="0"/>
           </a:p>
         </p:txBody>
@@ -2020,10 +1824,6 @@
           <a:bodyPr/>
           <a:lstStyle/>
           <a:p>
-            <a:r>
-              <a:rPr lang="en-US" dirty="0"/>
-              <a:t/>
-            </a:r>
             <a:endParaRPr lang="en-US" dirty="0"/>
           </a:p>
         </p:txBody>
@@ -2108,10 +1908,6 @@
           <a:bodyPr/>
           <a:lstStyle/>
           <a:p>
-            <a:r>
-              <a:rPr lang="en-US" dirty="0"/>
-              <a:t/>
-            </a:r>
             <a:endParaRPr lang="en-US" dirty="0"/>
           </a:p>
         </p:txBody>
@@ -2196,10 +1992,6 @@
           <a:bodyPr/>
           <a:lstStyle/>
           <a:p>
-            <a:r>
-              <a:rPr lang="en-US" dirty="0"/>
-              <a:t/>
-            </a:r>
             <a:endParaRPr lang="en-US" dirty="0"/>
           </a:p>
         </p:txBody>
@@ -2284,10 +2076,6 @@
           <a:bodyPr/>
           <a:lstStyle/>
           <a:p>
-            <a:r>
-              <a:rPr lang="en-US" dirty="0"/>
-              <a:t/>
-            </a:r>
             <a:endParaRPr lang="en-US" dirty="0"/>
           </a:p>
         </p:txBody>
@@ -2372,10 +2160,6 @@
           <a:bodyPr/>
           <a:lstStyle/>
           <a:p>
-            <a:r>
-              <a:rPr lang="en-US" dirty="0"/>
-              <a:t/>
-            </a:r>
             <a:endParaRPr lang="en-US" dirty="0"/>
           </a:p>
         </p:txBody>
@@ -2460,10 +2244,6 @@
           <a:bodyPr/>
           <a:lstStyle/>
           <a:p>
-            <a:r>
-              <a:rPr lang="en-US" dirty="0"/>
-              <a:t/>
-            </a:r>
             <a:endParaRPr lang="en-US" dirty="0"/>
           </a:p>
         </p:txBody>
@@ -2548,10 +2328,6 @@
           <a:bodyPr/>
           <a:lstStyle/>
           <a:p>
-            <a:r>
-              <a:rPr lang="en-US" dirty="0"/>
-              <a:t/>
-            </a:r>
             <a:endParaRPr lang="en-US" dirty="0"/>
           </a:p>
         </p:txBody>
@@ -2636,10 +2412,6 @@
           <a:bodyPr/>
           <a:lstStyle/>
           <a:p>
-            <a:r>
-              <a:rPr lang="en-US" dirty="0"/>
-              <a:t/>
-            </a:r>
             <a:endParaRPr lang="en-US" dirty="0"/>
           </a:p>
         </p:txBody>
@@ -2724,10 +2496,6 @@
           <a:bodyPr/>
           <a:lstStyle/>
           <a:p>
-            <a:r>
-              <a:rPr lang="en-US" dirty="0"/>
-              <a:t/>
-            </a:r>
             <a:endParaRPr lang="en-US" dirty="0"/>
           </a:p>
         </p:txBody>
@@ -2812,10 +2580,6 @@
           <a:bodyPr/>
           <a:lstStyle/>
           <a:p>
-            <a:r>
-              <a:rPr lang="en-US" dirty="0"/>
-              <a:t/>
-            </a:r>
             <a:endParaRPr lang="en-US" dirty="0"/>
           </a:p>
         </p:txBody>
@@ -2900,10 +2664,6 @@
           <a:bodyPr/>
           <a:lstStyle/>
           <a:p>
-            <a:r>
-              <a:rPr lang="en-US" dirty="0"/>
-              <a:t/>
-            </a:r>
             <a:endParaRPr lang="en-US" dirty="0"/>
           </a:p>
         </p:txBody>
@@ -2982,6 +2742,7 @@
         <a:solidFill>
           <a:srgbClr val="000000"/>
         </a:solidFill>
+        <a:effectLst/>
       </p:bgPr>
     </p:bg>
     <p:spTree>
@@ -3041,7 +2802,7 @@
       <p:pic>
         <p:nvPicPr>
           <p:cNvPr id="4" name="Image 0" descr="preencoded.png">
-            <a:hlinkClick r:id="rId2" tooltip=""/>
+            <a:hlinkClick r:id="rId2"/>
           </p:cNvPr>
           <p:cNvPicPr>
             <a:picLocks noChangeAspect="1"/>
@@ -3049,7 +2810,7 @@
           <p:nvPr/>
         </p:nvPicPr>
         <p:blipFill>
-          <a:blip r:embed="rId1"/>
+          <a:blip r:embed="rId3"/>
           <a:stretch>
             <a:fillRect/>
           </a:stretch>
@@ -3080,6 +2841,7 @@
         <a:solidFill>
           <a:srgbClr val="000000"/>
         </a:solidFill>
+        <a:effectLst/>
       </p:bgPr>
     </p:bg>
     <p:spTree>
@@ -3139,7 +2901,7 @@
       <p:pic>
         <p:nvPicPr>
           <p:cNvPr id="4" name="Image 0" descr="preencoded.png">
-            <a:hlinkClick r:id="rId2" tooltip=""/>
+            <a:hlinkClick r:id="rId2"/>
           </p:cNvPr>
           <p:cNvPicPr>
             <a:picLocks noChangeAspect="1"/>
@@ -3147,7 +2909,7 @@
           <p:nvPr/>
         </p:nvPicPr>
         <p:blipFill>
-          <a:blip r:embed="rId1"/>
+          <a:blip r:embed="rId3"/>
           <a:stretch>
             <a:fillRect/>
           </a:stretch>
@@ -3178,6 +2940,7 @@
         <a:solidFill>
           <a:srgbClr val="000000"/>
         </a:solidFill>
+        <a:effectLst/>
       </p:bgPr>
     </p:bg>
     <p:spTree>
@@ -3237,7 +3000,7 @@
       <p:pic>
         <p:nvPicPr>
           <p:cNvPr id="4" name="Image 0" descr="preencoded.png">
-            <a:hlinkClick r:id="rId2" tooltip=""/>
+            <a:hlinkClick r:id="rId2"/>
           </p:cNvPr>
           <p:cNvPicPr>
             <a:picLocks noChangeAspect="1"/>
@@ -3245,7 +3008,7 @@
           <p:nvPr/>
         </p:nvPicPr>
         <p:blipFill>
-          <a:blip r:embed="rId1"/>
+          <a:blip r:embed="rId3"/>
           <a:stretch>
             <a:fillRect/>
           </a:stretch>
@@ -3276,6 +3039,7 @@
         <a:solidFill>
           <a:srgbClr val="000000"/>
         </a:solidFill>
+        <a:effectLst/>
       </p:bgPr>
     </p:bg>
     <p:spTree>
@@ -3335,7 +3099,7 @@
       <p:pic>
         <p:nvPicPr>
           <p:cNvPr id="4" name="Image 0" descr="preencoded.png">
-            <a:hlinkClick r:id="rId2" tooltip=""/>
+            <a:hlinkClick r:id="rId2"/>
           </p:cNvPr>
           <p:cNvPicPr>
             <a:picLocks noChangeAspect="1"/>
@@ -3343,7 +3107,7 @@
           <p:nvPr/>
         </p:nvPicPr>
         <p:blipFill>
-          <a:blip r:embed="rId1"/>
+          <a:blip r:embed="rId3"/>
           <a:stretch>
             <a:fillRect/>
           </a:stretch>
@@ -3374,6 +3138,7 @@
         <a:solidFill>
           <a:srgbClr val="000000"/>
         </a:solidFill>
+        <a:effectLst/>
       </p:bgPr>
     </p:bg>
     <p:spTree>
@@ -3433,7 +3198,7 @@
       <p:pic>
         <p:nvPicPr>
           <p:cNvPr id="4" name="Image 0" descr="preencoded.png">
-            <a:hlinkClick r:id="rId2" tooltip=""/>
+            <a:hlinkClick r:id="rId2"/>
           </p:cNvPr>
           <p:cNvPicPr>
             <a:picLocks noChangeAspect="1"/>
@@ -3441,7 +3206,7 @@
           <p:nvPr/>
         </p:nvPicPr>
         <p:blipFill>
-          <a:blip r:embed="rId1"/>
+          <a:blip r:embed="rId3"/>
           <a:stretch>
             <a:fillRect/>
           </a:stretch>
@@ -3472,6 +3237,7 @@
         <a:solidFill>
           <a:srgbClr val="000000"/>
         </a:solidFill>
+        <a:effectLst/>
       </p:bgPr>
     </p:bg>
     <p:spTree>
@@ -3531,7 +3297,7 @@
       <p:pic>
         <p:nvPicPr>
           <p:cNvPr id="4" name="Image 0" descr="preencoded.png">
-            <a:hlinkClick r:id="rId2" tooltip=""/>
+            <a:hlinkClick r:id="rId2"/>
           </p:cNvPr>
           <p:cNvPicPr>
             <a:picLocks noChangeAspect="1"/>
@@ -3539,7 +3305,7 @@
           <p:nvPr/>
         </p:nvPicPr>
         <p:blipFill>
-          <a:blip r:embed="rId1"/>
+          <a:blip r:embed="rId3"/>
           <a:stretch>
             <a:fillRect/>
           </a:stretch>
@@ -3570,6 +3336,7 @@
         <a:solidFill>
           <a:srgbClr val="000000"/>
         </a:solidFill>
+        <a:effectLst/>
       </p:bgPr>
     </p:bg>
     <p:spTree>
@@ -3629,7 +3396,7 @@
       <p:pic>
         <p:nvPicPr>
           <p:cNvPr id="4" name="Image 0" descr="preencoded.png">
-            <a:hlinkClick r:id="rId2" tooltip=""/>
+            <a:hlinkClick r:id="rId2"/>
           </p:cNvPr>
           <p:cNvPicPr>
             <a:picLocks noChangeAspect="1"/>
@@ -3637,7 +3404,7 @@
           <p:nvPr/>
         </p:nvPicPr>
         <p:blipFill>
-          <a:blip r:embed="rId1"/>
+          <a:blip r:embed="rId3"/>
           <a:stretch>
             <a:fillRect/>
           </a:stretch>
@@ -3668,6 +3435,7 @@
         <a:solidFill>
           <a:srgbClr val="000000"/>
         </a:solidFill>
+        <a:effectLst/>
       </p:bgPr>
     </p:bg>
     <p:spTree>
@@ -3727,7 +3495,7 @@
       <p:pic>
         <p:nvPicPr>
           <p:cNvPr id="4" name="Image 0" descr="preencoded.png">
-            <a:hlinkClick r:id="rId2" tooltip=""/>
+            <a:hlinkClick r:id="rId2"/>
           </p:cNvPr>
           <p:cNvPicPr>
             <a:picLocks noChangeAspect="1"/>
@@ -3735,7 +3503,7 @@
           <p:nvPr/>
         </p:nvPicPr>
         <p:blipFill>
-          <a:blip r:embed="rId1"/>
+          <a:blip r:embed="rId3"/>
           <a:stretch>
             <a:fillRect/>
           </a:stretch>
@@ -3766,6 +3534,7 @@
         <a:solidFill>
           <a:srgbClr val="000000"/>
         </a:solidFill>
+        <a:effectLst/>
       </p:bgPr>
     </p:bg>
     <p:spTree>
@@ -3825,7 +3594,7 @@
       <p:pic>
         <p:nvPicPr>
           <p:cNvPr id="4" name="Image 0" descr="preencoded.png">
-            <a:hlinkClick r:id="rId2" tooltip=""/>
+            <a:hlinkClick r:id="rId2"/>
           </p:cNvPr>
           <p:cNvPicPr>
             <a:picLocks noChangeAspect="1"/>
@@ -3833,7 +3602,7 @@
           <p:nvPr/>
         </p:nvPicPr>
         <p:blipFill>
-          <a:blip r:embed="rId1"/>
+          <a:blip r:embed="rId3"/>
           <a:stretch>
             <a:fillRect/>
           </a:stretch>
@@ -3864,6 +3633,7 @@
         <a:solidFill>
           <a:srgbClr val="000000"/>
         </a:solidFill>
+        <a:effectLst/>
       </p:bgPr>
     </p:bg>
     <p:spTree>
@@ -3923,7 +3693,7 @@
       <p:pic>
         <p:nvPicPr>
           <p:cNvPr id="4" name="Image 0" descr="preencoded.png">
-            <a:hlinkClick r:id="rId2" tooltip=""/>
+            <a:hlinkClick r:id="rId2"/>
           </p:cNvPr>
           <p:cNvPicPr>
             <a:picLocks noChangeAspect="1"/>
@@ -3931,7 +3701,7 @@
           <p:nvPr/>
         </p:nvPicPr>
         <p:blipFill>
-          <a:blip r:embed="rId1"/>
+          <a:blip r:embed="rId3"/>
           <a:stretch>
             <a:fillRect/>
           </a:stretch>
@@ -3962,6 +3732,7 @@
         <a:solidFill>
           <a:srgbClr val="000000"/>
         </a:solidFill>
+        <a:effectLst/>
       </p:bgPr>
     </p:bg>
     <p:spTree>
@@ -4021,7 +3792,7 @@
       <p:pic>
         <p:nvPicPr>
           <p:cNvPr id="4" name="Image 0" descr="preencoded.png">
-            <a:hlinkClick r:id="rId2" tooltip=""/>
+            <a:hlinkClick r:id="rId2"/>
           </p:cNvPr>
           <p:cNvPicPr>
             <a:picLocks noChangeAspect="1"/>
@@ -4029,7 +3800,7 @@
           <p:nvPr/>
         </p:nvPicPr>
         <p:blipFill>
-          <a:blip r:embed="rId1"/>
+          <a:blip r:embed="rId3"/>
           <a:stretch>
             <a:fillRect/>
           </a:stretch>
@@ -4060,6 +3831,7 @@
         <a:solidFill>
           <a:srgbClr val="000000"/>
         </a:solidFill>
+        <a:effectLst/>
       </p:bgPr>
     </p:bg>
     <p:spTree>
@@ -4119,7 +3891,7 @@
       <p:pic>
         <p:nvPicPr>
           <p:cNvPr id="4" name="Image 0" descr="preencoded.png">
-            <a:hlinkClick r:id="rId2" tooltip=""/>
+            <a:hlinkClick r:id="rId2"/>
           </p:cNvPr>
           <p:cNvPicPr>
             <a:picLocks noChangeAspect="1"/>
@@ -4127,7 +3899,7 @@
           <p:nvPr/>
         </p:nvPicPr>
         <p:blipFill>
-          <a:blip r:embed="rId1"/>
+          <a:blip r:embed="rId3"/>
           <a:stretch>
             <a:fillRect/>
           </a:stretch>
@@ -4158,6 +3930,7 @@
         <a:solidFill>
           <a:srgbClr val="000000"/>
         </a:solidFill>
+        <a:effectLst/>
       </p:bgPr>
     </p:bg>
     <p:spTree>
@@ -4217,7 +3990,7 @@
       <p:pic>
         <p:nvPicPr>
           <p:cNvPr id="4" name="Image 0" descr="preencoded.png">
-            <a:hlinkClick r:id="rId2" tooltip=""/>
+            <a:hlinkClick r:id="rId2"/>
           </p:cNvPr>
           <p:cNvPicPr>
             <a:picLocks noChangeAspect="1"/>
@@ -4225,7 +3998,7 @@
           <p:nvPr/>
         </p:nvPicPr>
         <p:blipFill>
-          <a:blip r:embed="rId1"/>
+          <a:blip r:embed="rId3"/>
           <a:stretch>
             <a:fillRect/>
           </a:stretch>
@@ -4256,6 +4029,7 @@
         <a:solidFill>
           <a:srgbClr val="000000"/>
         </a:solidFill>
+        <a:effectLst/>
       </p:bgPr>
     </p:bg>
     <p:spTree>
@@ -4315,7 +4089,7 @@
       <p:pic>
         <p:nvPicPr>
           <p:cNvPr id="4" name="Image 0" descr="preencoded.png">
-            <a:hlinkClick r:id="rId2" tooltip=""/>
+            <a:hlinkClick r:id="rId2"/>
           </p:cNvPr>
           <p:cNvPicPr>
             <a:picLocks noChangeAspect="1"/>
@@ -4323,7 +4097,7 @@
           <p:nvPr/>
         </p:nvPicPr>
         <p:blipFill>
-          <a:blip r:embed="rId1"/>
+          <a:blip r:embed="rId3"/>
           <a:stretch>
             <a:fillRect/>
           </a:stretch>
@@ -4354,6 +4128,7 @@
         <a:solidFill>
           <a:srgbClr val="000000"/>
         </a:solidFill>
+        <a:effectLst/>
       </p:bgPr>
     </p:bg>
     <p:spTree>
@@ -4413,7 +4188,7 @@
       <p:pic>
         <p:nvPicPr>
           <p:cNvPr id="4" name="Image 0" descr="preencoded.png">
-            <a:hlinkClick r:id="rId2" tooltip=""/>
+            <a:hlinkClick r:id="rId2"/>
           </p:cNvPr>
           <p:cNvPicPr>
             <a:picLocks noChangeAspect="1"/>
@@ -4421,7 +4196,7 @@
           <p:nvPr/>
         </p:nvPicPr>
         <p:blipFill>
-          <a:blip r:embed="rId1"/>
+          <a:blip r:embed="rId3"/>
           <a:stretch>
             <a:fillRect/>
           </a:stretch>
@@ -4452,6 +4227,7 @@
         <a:solidFill>
           <a:srgbClr val="000000"/>
         </a:solidFill>
+        <a:effectLst/>
       </p:bgPr>
     </p:bg>
     <p:spTree>
@@ -4511,7 +4287,7 @@
       <p:pic>
         <p:nvPicPr>
           <p:cNvPr id="4" name="Image 0" descr="preencoded.png">
-            <a:hlinkClick r:id="rId2" tooltip=""/>
+            <a:hlinkClick r:id="rId2"/>
           </p:cNvPr>
           <p:cNvPicPr>
             <a:picLocks noChangeAspect="1"/>
@@ -4519,7 +4295,7 @@
           <p:nvPr/>
         </p:nvPicPr>
         <p:blipFill>
-          <a:blip r:embed="rId1"/>
+          <a:blip r:embed="rId3"/>
           <a:stretch>
             <a:fillRect/>
           </a:stretch>
@@ -4550,6 +4326,7 @@
         <a:solidFill>
           <a:srgbClr val="000000"/>
         </a:solidFill>
+        <a:effectLst/>
       </p:bgPr>
     </p:bg>
     <p:spTree>
@@ -4609,7 +4386,7 @@
       <p:pic>
         <p:nvPicPr>
           <p:cNvPr id="4" name="Image 0" descr="preencoded.png">
-            <a:hlinkClick r:id="rId2" tooltip=""/>
+            <a:hlinkClick r:id="rId2"/>
           </p:cNvPr>
           <p:cNvPicPr>
             <a:picLocks noChangeAspect="1"/>
@@ -4617,7 +4394,7 @@
           <p:nvPr/>
         </p:nvPicPr>
         <p:blipFill>
-          <a:blip r:embed="rId1"/>
+          <a:blip r:embed="rId3"/>
           <a:stretch>
             <a:fillRect/>
           </a:stretch>
@@ -4648,6 +4425,7 @@
         <a:solidFill>
           <a:srgbClr val="000000"/>
         </a:solidFill>
+        <a:effectLst/>
       </p:bgPr>
     </p:bg>
     <p:spTree>
@@ -4707,7 +4485,7 @@
       <p:pic>
         <p:nvPicPr>
           <p:cNvPr id="4" name="Image 0" descr="preencoded.png">
-            <a:hlinkClick r:id="rId2" tooltip=""/>
+            <a:hlinkClick r:id="rId2"/>
           </p:cNvPr>
           <p:cNvPicPr>
             <a:picLocks noChangeAspect="1"/>
@@ -4715,7 +4493,7 @@
           <p:nvPr/>
         </p:nvPicPr>
         <p:blipFill>
-          <a:blip r:embed="rId1"/>
+          <a:blip r:embed="rId3"/>
           <a:stretch>
             <a:fillRect/>
           </a:stretch>
@@ -4746,6 +4524,7 @@
         <a:solidFill>
           <a:srgbClr val="000000"/>
         </a:solidFill>
+        <a:effectLst/>
       </p:bgPr>
     </p:bg>
     <p:spTree>
@@ -4805,7 +4584,7 @@
       <p:pic>
         <p:nvPicPr>
           <p:cNvPr id="4" name="Image 0" descr="preencoded.png">
-            <a:hlinkClick r:id="rId2" tooltip=""/>
+            <a:hlinkClick r:id="rId2"/>
           </p:cNvPr>
           <p:cNvPicPr>
             <a:picLocks noChangeAspect="1"/>
@@ -4813,7 +4592,7 @@
           <p:nvPr/>
         </p:nvPicPr>
         <p:blipFill>
-          <a:blip r:embed="rId1"/>
+          <a:blip r:embed="rId3"/>
           <a:stretch>
             <a:fillRect/>
           </a:stretch>
@@ -4844,6 +4623,7 @@
         <a:solidFill>
           <a:srgbClr val="000000"/>
         </a:solidFill>
+        <a:effectLst/>
       </p:bgPr>
     </p:bg>
     <p:spTree>
@@ -4903,7 +4683,7 @@
       <p:pic>
         <p:nvPicPr>
           <p:cNvPr id="4" name="Image 0" descr="preencoded.png">
-            <a:hlinkClick r:id="rId2" tooltip=""/>
+            <a:hlinkClick r:id="rId2"/>
           </p:cNvPr>
           <p:cNvPicPr>
             <a:picLocks noChangeAspect="1"/>
@@ -4911,7 +4691,7 @@
           <p:nvPr/>
         </p:nvPicPr>
         <p:blipFill>
-          <a:blip r:embed="rId1"/>
+          <a:blip r:embed="rId3"/>
           <a:stretch>
             <a:fillRect/>
           </a:stretch>
@@ -4942,6 +4722,7 @@
         <a:solidFill>
           <a:srgbClr val="000000"/>
         </a:solidFill>
+        <a:effectLst/>
       </p:bgPr>
     </p:bg>
     <p:spTree>
@@ -5001,7 +4782,7 @@
       <p:pic>
         <p:nvPicPr>
           <p:cNvPr id="4" name="Image 0" descr="preencoded.png">
-            <a:hlinkClick r:id="rId2" tooltip=""/>
+            <a:hlinkClick r:id="rId2"/>
           </p:cNvPr>
           <p:cNvPicPr>
             <a:picLocks noChangeAspect="1"/>
@@ -5009,7 +4790,7 @@
           <p:nvPr/>
         </p:nvPicPr>
         <p:blipFill>
-          <a:blip r:embed="rId1"/>
+          <a:blip r:embed="rId3"/>
           <a:stretch>
             <a:fillRect/>
           </a:stretch>
@@ -5040,6 +4821,7 @@
         <a:solidFill>
           <a:srgbClr val="000000"/>
         </a:solidFill>
+        <a:effectLst/>
       </p:bgPr>
     </p:bg>
     <p:spTree>
@@ -5099,7 +4881,7 @@
       <p:pic>
         <p:nvPicPr>
           <p:cNvPr id="4" name="Image 0" descr="preencoded.png">
-            <a:hlinkClick r:id="rId2" tooltip=""/>
+            <a:hlinkClick r:id="rId2"/>
           </p:cNvPr>
           <p:cNvPicPr>
             <a:picLocks noChangeAspect="1"/>
@@ -5107,7 +4889,7 @@
           <p:nvPr/>
         </p:nvPicPr>
         <p:blipFill>
-          <a:blip r:embed="rId1"/>
+          <a:blip r:embed="rId3"/>
           <a:stretch>
             <a:fillRect/>
           </a:stretch>
@@ -5138,6 +4920,7 @@
         <a:solidFill>
           <a:srgbClr val="000000"/>
         </a:solidFill>
+        <a:effectLst/>
       </p:bgPr>
     </p:bg>
     <p:spTree>
@@ -5197,7 +4980,7 @@
       <p:pic>
         <p:nvPicPr>
           <p:cNvPr id="4" name="Image 0" descr="preencoded.png">
-            <a:hlinkClick r:id="rId2" tooltip=""/>
+            <a:hlinkClick r:id="rId2"/>
           </p:cNvPr>
           <p:cNvPicPr>
             <a:picLocks noChangeAspect="1"/>
@@ -5205,7 +4988,7 @@
           <p:nvPr/>
         </p:nvPicPr>
         <p:blipFill>
-          <a:blip r:embed="rId1"/>
+          <a:blip r:embed="rId3"/>
           <a:stretch>
             <a:fillRect/>
           </a:stretch>
@@ -5236,6 +5019,7 @@
         <a:solidFill>
           <a:srgbClr val="000000"/>
         </a:solidFill>
+        <a:effectLst/>
       </p:bgPr>
     </p:bg>
     <p:spTree>
@@ -5295,7 +5079,7 @@
       <p:pic>
         <p:nvPicPr>
           <p:cNvPr id="4" name="Image 0" descr="preencoded.png">
-            <a:hlinkClick r:id="rId2" tooltip=""/>
+            <a:hlinkClick r:id="rId2"/>
           </p:cNvPr>
           <p:cNvPicPr>
             <a:picLocks noChangeAspect="1"/>
@@ -5303,7 +5087,7 @@
           <p:nvPr/>
         </p:nvPicPr>
         <p:blipFill>
-          <a:blip r:embed="rId1"/>
+          <a:blip r:embed="rId3"/>
           <a:stretch>
             <a:fillRect/>
           </a:stretch>
@@ -5334,6 +5118,7 @@
         <a:solidFill>
           <a:srgbClr val="000000"/>
         </a:solidFill>
+        <a:effectLst/>
       </p:bgPr>
     </p:bg>
     <p:spTree>
@@ -5393,7 +5178,7 @@
       <p:pic>
         <p:nvPicPr>
           <p:cNvPr id="4" name="Image 0" descr="preencoded.png">
-            <a:hlinkClick r:id="rId2" tooltip=""/>
+            <a:hlinkClick r:id="rId2"/>
           </p:cNvPr>
           <p:cNvPicPr>
             <a:picLocks noChangeAspect="1"/>
@@ -5401,7 +5186,7 @@
           <p:nvPr/>
         </p:nvPicPr>
         <p:blipFill>
-          <a:blip r:embed="rId1"/>
+          <a:blip r:embed="rId3"/>
           <a:stretch>
             <a:fillRect/>
           </a:stretch>
@@ -5432,6 +5217,7 @@
         <a:solidFill>
           <a:srgbClr val="000000"/>
         </a:solidFill>
+        <a:effectLst/>
       </p:bgPr>
     </p:bg>
     <p:spTree>
@@ -5491,7 +5277,7 @@
       <p:pic>
         <p:nvPicPr>
           <p:cNvPr id="4" name="Image 0" descr="preencoded.png">
-            <a:hlinkClick r:id="rId2" tooltip=""/>
+            <a:hlinkClick r:id="rId2"/>
           </p:cNvPr>
           <p:cNvPicPr>
             <a:picLocks noChangeAspect="1"/>
@@ -5499,7 +5285,7 @@
           <p:nvPr/>
         </p:nvPicPr>
         <p:blipFill>
-          <a:blip r:embed="rId1"/>
+          <a:blip r:embed="rId3"/>
           <a:stretch>
             <a:fillRect/>
           </a:stretch>
@@ -5530,6 +5316,7 @@
         <a:solidFill>
           <a:srgbClr val="000000"/>
         </a:solidFill>
+        <a:effectLst/>
       </p:bgPr>
     </p:bg>
     <p:spTree>
@@ -5589,7 +5376,7 @@
       <p:pic>
         <p:nvPicPr>
           <p:cNvPr id="4" name="Image 0" descr="preencoded.png">
-            <a:hlinkClick r:id="rId2" tooltip=""/>
+            <a:hlinkClick r:id="rId2"/>
           </p:cNvPr>
           <p:cNvPicPr>
             <a:picLocks noChangeAspect="1"/>
@@ -5597,7 +5384,7 @@
           <p:nvPr/>
         </p:nvPicPr>
         <p:blipFill>
-          <a:blip r:embed="rId1"/>
+          <a:blip r:embed="rId3"/>
           <a:stretch>
             <a:fillRect/>
           </a:stretch>
@@ -5628,6 +5415,7 @@
         <a:solidFill>
           <a:srgbClr val="000000"/>
         </a:solidFill>
+        <a:effectLst/>
       </p:bgPr>
     </p:bg>
     <p:spTree>
@@ -5687,7 +5475,7 @@
       <p:pic>
         <p:nvPicPr>
           <p:cNvPr id="4" name="Image 0" descr="preencoded.png">
-            <a:hlinkClick r:id="rId2" tooltip=""/>
+            <a:hlinkClick r:id="rId2"/>
           </p:cNvPr>
           <p:cNvPicPr>
             <a:picLocks noChangeAspect="1"/>
@@ -5695,7 +5483,7 @@
           <p:nvPr/>
         </p:nvPicPr>
         <p:blipFill>
-          <a:blip r:embed="rId1"/>
+          <a:blip r:embed="rId3"/>
           <a:stretch>
             <a:fillRect/>
           </a:stretch>
@@ -5726,6 +5514,7 @@
         <a:solidFill>
           <a:srgbClr val="000000"/>
         </a:solidFill>
+        <a:effectLst/>
       </p:bgPr>
     </p:bg>
     <p:spTree>
@@ -5785,7 +5574,7 @@
       <p:pic>
         <p:nvPicPr>
           <p:cNvPr id="4" name="Image 0" descr="preencoded.png">
-            <a:hlinkClick r:id="rId2" tooltip=""/>
+            <a:hlinkClick r:id="rId2"/>
           </p:cNvPr>
           <p:cNvPicPr>
             <a:picLocks noChangeAspect="1"/>
@@ -5793,7 +5582,7 @@
           <p:nvPr/>
         </p:nvPicPr>
         <p:blipFill>
-          <a:blip r:embed="rId1"/>
+          <a:blip r:embed="rId3"/>
           <a:stretch>
             <a:fillRect/>
           </a:stretch>
@@ -5819,6 +5608,11 @@
 <file path=ppt/slideMasters/slideMaster1.xml><?xml version="1.0" encoding="utf-8"?>
 <p:sldMaster xmlns:a="http://schemas.openxmlformats.org/drawingml/2006/main" xmlns:r="http://schemas.openxmlformats.org/officeDocument/2006/relationships" xmlns:p="http://schemas.openxmlformats.org/presentationml/2006/main">
   <p:cSld>
+    <p:bg>
+      <p:bgRef idx="1001">
+        <a:schemeClr val="bg1"/>
+      </p:bgRef>
+    </p:bg>
     <p:spTree>
       <p:nvGrpSpPr>
         <p:cNvPr id="1" name=""/>
@@ -6160,7 +5954,7 @@
           <a:bodyPr wrap="none" lIns="0" tIns="0" rIns="0" bIns="0" rtlCol="0" anchor="t"/>
           <a:lstStyle/>
           <a:p>
-            <a:pPr algn="l" indent="0" marL="0">
+            <a:pPr marL="0" indent="0" algn="l">
               <a:lnSpc>
                 <a:spcPts val="5550"/>
               </a:lnSpc>
@@ -6202,7 +5996,7 @@
           <a:bodyPr wrap="none" lIns="0" tIns="0" rIns="0" bIns="0" rtlCol="0" anchor="t"/>
           <a:lstStyle/>
           <a:p>
-            <a:pPr algn="l" indent="0" marL="0">
+            <a:pPr marL="0" indent="0" algn="l">
               <a:lnSpc>
                 <a:spcPts val="5550"/>
               </a:lnSpc>
@@ -6269,7 +6063,7 @@
           <a:bodyPr wrap="none" lIns="0" tIns="0" rIns="0" bIns="0" rtlCol="0" anchor="t"/>
           <a:lstStyle/>
           <a:p>
-            <a:pPr algn="l" indent="0" marL="0">
+            <a:pPr marL="0" indent="0" algn="l">
               <a:lnSpc>
                 <a:spcPts val="4450"/>
               </a:lnSpc>
@@ -6311,7 +6105,7 @@
           <a:bodyPr wrap="square" lIns="0" tIns="0" rIns="0" bIns="0" rtlCol="0" anchor="t"/>
           <a:lstStyle/>
           <a:p>
-            <a:pPr algn="l" indent="0" marL="0">
+            <a:pPr marL="0" indent="0" algn="l">
               <a:lnSpc>
                 <a:spcPts val="2850"/>
               </a:lnSpc>
@@ -6328,12 +6122,6 @@
               </a:rPr>
               <a:t>3. </a:t>
             </a:r>
-            <a:pPr algn="l" indent="0" marL="0">
-              <a:lnSpc>
-                <a:spcPts val="2850"/>
-              </a:lnSpc>
-              <a:buNone/>
-            </a:pPr>
             <a:r>
               <a:rPr lang="en-US" sz="1750" b="1" dirty="0">
                 <a:solidFill>
@@ -6345,12 +6133,6 @@
               </a:rPr>
               <a:t>Maintenance Process</a:t>
             </a:r>
-            <a:pPr algn="l" indent="0" marL="0">
-              <a:lnSpc>
-                <a:spcPts val="2850"/>
-              </a:lnSpc>
-              <a:buNone/>
-            </a:pPr>
             <a:r>
               <a:rPr lang="en-US" sz="1750" dirty="0">
                 <a:solidFill>
@@ -6387,7 +6169,7 @@
           <a:bodyPr wrap="square" lIns="0" tIns="0" rIns="0" bIns="0" rtlCol="0" anchor="t"/>
           <a:lstStyle/>
           <a:p>
-            <a:pPr algn="l" marL="342900" indent="-342900">
+            <a:pPr marL="342900" indent="-342900" algn="l">
               <a:lnSpc>
                 <a:spcPts val="2850"/>
               </a:lnSpc>
@@ -6405,12 +6187,6 @@
               </a:rPr>
               <a:t>Capturing change requirements</a:t>
             </a:r>
-            <a:pPr algn="l" indent="0" marL="0">
-              <a:lnSpc>
-                <a:spcPts val="2850"/>
-              </a:lnSpc>
-              <a:buNone/>
-            </a:pPr>
             <a:r>
               <a:rPr lang="en-US" sz="1750" dirty="0">
                 <a:solidFill>
@@ -6447,7 +6223,7 @@
           <a:bodyPr wrap="square" lIns="0" tIns="0" rIns="0" bIns="0" rtlCol="0" anchor="t"/>
           <a:lstStyle/>
           <a:p>
-            <a:pPr algn="l" marL="342900" indent="-342900">
+            <a:pPr marL="342900" indent="-342900" algn="l">
               <a:lnSpc>
                 <a:spcPts val="2850"/>
               </a:lnSpc>
@@ -6465,12 +6241,6 @@
               </a:rPr>
               <a:t>Variation in programming practice</a:t>
             </a:r>
-            <a:pPr algn="l" indent="0" marL="0">
-              <a:lnSpc>
-                <a:spcPts val="2850"/>
-              </a:lnSpc>
-              <a:buNone/>
-            </a:pPr>
             <a:r>
               <a:rPr lang="en-US" sz="1750" dirty="0">
                 <a:solidFill>
@@ -6532,7 +6302,7 @@
           <a:bodyPr wrap="none" lIns="0" tIns="0" rIns="0" bIns="0" rtlCol="0" anchor="t"/>
           <a:lstStyle/>
           <a:p>
-            <a:pPr algn="l" indent="0" marL="0">
+            <a:pPr marL="0" indent="0" algn="l">
               <a:lnSpc>
                 <a:spcPts val="4450"/>
               </a:lnSpc>
@@ -6574,7 +6344,7 @@
           <a:bodyPr wrap="square" lIns="0" tIns="0" rIns="0" bIns="0" rtlCol="0" anchor="t"/>
           <a:lstStyle/>
           <a:p>
-            <a:pPr algn="l" marL="342900" indent="-342900">
+            <a:pPr marL="342900" indent="-342900" algn="l">
               <a:lnSpc>
                 <a:spcPts val="2850"/>
               </a:lnSpc>
@@ -6592,12 +6362,6 @@
               </a:rPr>
               <a:t>Paradigm shift:</a:t>
             </a:r>
-            <a:pPr algn="l" indent="0" marL="0">
-              <a:lnSpc>
-                <a:spcPts val="2850"/>
-              </a:lnSpc>
-              <a:buNone/>
-            </a:pPr>
             <a:r>
               <a:rPr lang="en-US" sz="1750" dirty="0">
                 <a:solidFill>
@@ -6634,7 +6398,7 @@
           <a:bodyPr wrap="square" lIns="0" tIns="0" rIns="0" bIns="0" rtlCol="0" anchor="t"/>
           <a:lstStyle/>
           <a:p>
-            <a:pPr algn="l" marL="342900" indent="-342900">
+            <a:pPr marL="342900" indent="-342900" algn="l">
               <a:lnSpc>
                 <a:spcPts val="2850"/>
               </a:lnSpc>
@@ -6652,12 +6416,6 @@
               </a:rPr>
               <a:t>Dead' paradigms for 'living' systems:</a:t>
             </a:r>
-            <a:pPr algn="l" indent="0" marL="0">
-              <a:lnSpc>
-                <a:spcPts val="2850"/>
-              </a:lnSpc>
-              <a:buNone/>
-            </a:pPr>
             <a:r>
               <a:rPr lang="en-US" sz="1750" dirty="0">
                 <a:solidFill>
@@ -6694,7 +6452,7 @@
           <a:bodyPr wrap="square" lIns="0" tIns="0" rIns="0" bIns="0" rtlCol="0" anchor="t"/>
           <a:lstStyle/>
           <a:p>
-            <a:pPr algn="l" marL="342900" indent="-342900">
+            <a:pPr marL="342900" indent="-342900" algn="l">
               <a:lnSpc>
                 <a:spcPts val="2850"/>
               </a:lnSpc>
@@ -6712,12 +6470,6 @@
               </a:rPr>
               <a:t>Error detection and correction:</a:t>
             </a:r>
-            <a:pPr algn="l" indent="0" marL="0">
-              <a:lnSpc>
-                <a:spcPts val="2850"/>
-              </a:lnSpc>
-              <a:buNone/>
-            </a:pPr>
             <a:r>
               <a:rPr lang="en-US" sz="1750" dirty="0">
                 <a:solidFill>
@@ -6760,14 +6512,14 @@
       </p:grpSpPr>
       <p:pic>
         <p:nvPicPr>
-          <p:cNvPr id="2" name="Image 0" descr="preencoded.png">    </p:cNvPr>
+          <p:cNvPr id="2" name="Image 0" descr="preencoded.png"/>
           <p:cNvPicPr>
             <a:picLocks noChangeAspect="1"/>
           </p:cNvPicPr>
           <p:nvPr/>
         </p:nvPicPr>
         <p:blipFill>
-          <a:blip r:embed="rId1"/>
+          <a:blip r:embed="rId3"/>
           <a:stretch>
             <a:fillRect/>
           </a:stretch>
@@ -6828,7 +6580,7 @@
           <a:bodyPr wrap="none" lIns="0" tIns="0" rIns="0" bIns="0" rtlCol="0" anchor="t"/>
           <a:lstStyle/>
           <a:p>
-            <a:pPr algn="l" indent="0" marL="0">
+            <a:pPr marL="0" indent="0" algn="l">
               <a:lnSpc>
                 <a:spcPts val="4450"/>
               </a:lnSpc>
@@ -6870,7 +6622,7 @@
           <a:bodyPr wrap="square" lIns="0" tIns="0" rIns="0" bIns="0" rtlCol="0" anchor="t"/>
           <a:lstStyle/>
           <a:p>
-            <a:pPr algn="l" indent="0" marL="0">
+            <a:pPr marL="0" indent="0" algn="l">
               <a:lnSpc>
                 <a:spcPts val="2850"/>
               </a:lnSpc>
@@ -6887,12 +6639,6 @@
               </a:rPr>
               <a:t>4. </a:t>
             </a:r>
-            <a:pPr algn="l" indent="0" marL="0">
-              <a:lnSpc>
-                <a:spcPts val="2850"/>
-              </a:lnSpc>
-              <a:buNone/>
-            </a:pPr>
             <a:r>
               <a:rPr lang="en-US" sz="1750" b="1" dirty="0">
                 <a:solidFill>
@@ -6904,12 +6650,6 @@
               </a:rPr>
               <a:t>Software Product</a:t>
             </a:r>
-            <a:pPr algn="l" indent="0" marL="0">
-              <a:lnSpc>
-                <a:spcPts val="2850"/>
-              </a:lnSpc>
-              <a:buNone/>
-            </a:pPr>
             <a:r>
               <a:rPr lang="en-US" sz="1750" dirty="0">
                 <a:solidFill>
@@ -6946,7 +6686,7 @@
           <a:bodyPr wrap="square" lIns="0" tIns="0" rIns="0" bIns="0" rtlCol="0" anchor="t"/>
           <a:lstStyle/>
           <a:p>
-            <a:pPr algn="l" indent="0" marL="0">
+            <a:pPr marL="0" indent="0" algn="l">
               <a:lnSpc>
                 <a:spcPts val="3300"/>
               </a:lnSpc>
@@ -6988,7 +6728,7 @@
           <a:bodyPr wrap="square" lIns="0" tIns="0" rIns="0" bIns="0" rtlCol="0" anchor="t"/>
           <a:lstStyle/>
           <a:p>
-            <a:pPr algn="l" marL="342900" indent="-342900">
+            <a:pPr marL="342900" indent="-342900" algn="l">
               <a:lnSpc>
                 <a:spcPts val="2850"/>
               </a:lnSpc>
@@ -7006,12 +6746,6 @@
               </a:rPr>
               <a:t>Maturity and difficulty of the application domain</a:t>
             </a:r>
-            <a:pPr algn="l" indent="0" marL="0">
-              <a:lnSpc>
-                <a:spcPts val="2850"/>
-              </a:lnSpc>
-              <a:buNone/>
-            </a:pPr>
             <a:r>
               <a:rPr lang="en-US" sz="1750" dirty="0">
                 <a:solidFill>
@@ -7048,7 +6782,7 @@
           <a:bodyPr wrap="square" lIns="0" tIns="0" rIns="0" bIns="0" rtlCol="0" anchor="t"/>
           <a:lstStyle/>
           <a:p>
-            <a:pPr algn="l" indent="0" marL="0">
+            <a:pPr marL="0" indent="0" algn="l">
               <a:lnSpc>
                 <a:spcPts val="3300"/>
               </a:lnSpc>
@@ -7115,7 +6849,7 @@
           <a:bodyPr wrap="none" lIns="0" tIns="0" rIns="0" bIns="0" rtlCol="0" anchor="t"/>
           <a:lstStyle/>
           <a:p>
-            <a:pPr algn="l" indent="0" marL="0">
+            <a:pPr marL="0" indent="0" algn="l">
               <a:lnSpc>
                 <a:spcPts val="4450"/>
               </a:lnSpc>
@@ -7157,7 +6891,7 @@
           <a:bodyPr wrap="square" lIns="0" tIns="0" rIns="0" bIns="0" rtlCol="0" anchor="t"/>
           <a:lstStyle/>
           <a:p>
-            <a:pPr algn="l" marL="342900" indent="-342900">
+            <a:pPr marL="342900" indent="-342900" algn="l">
               <a:lnSpc>
                 <a:spcPts val="2850"/>
               </a:lnSpc>
@@ -7175,12 +6909,6 @@
               </a:rPr>
               <a:t>Quality of the documentation</a:t>
             </a:r>
-            <a:pPr algn="l" indent="0" marL="0">
-              <a:lnSpc>
-                <a:spcPts val="2850"/>
-              </a:lnSpc>
-              <a:buNone/>
-            </a:pPr>
             <a:r>
               <a:rPr lang="en-US" sz="1750" dirty="0">
                 <a:solidFill>
@@ -7217,7 +6945,7 @@
           <a:bodyPr wrap="square" lIns="0" tIns="0" rIns="0" bIns="0" rtlCol="0" anchor="t"/>
           <a:lstStyle/>
           <a:p>
-            <a:pPr algn="l" marL="342900" indent="-342900">
+            <a:pPr marL="342900" indent="-342900" algn="l">
               <a:lnSpc>
                 <a:spcPts val="2850"/>
               </a:lnSpc>
@@ -7235,12 +6963,6 @@
               </a:rPr>
               <a:t>Malleability of the programs:</a:t>
             </a:r>
-            <a:pPr algn="l" indent="0" marL="0">
-              <a:lnSpc>
-                <a:spcPts val="2850"/>
-              </a:lnSpc>
-              <a:buNone/>
-            </a:pPr>
             <a:r>
               <a:rPr lang="en-US" sz="1750" dirty="0">
                 <a:solidFill>
@@ -7277,7 +6999,7 @@
           <a:bodyPr wrap="square" lIns="0" tIns="0" rIns="0" bIns="0" rtlCol="0" anchor="t"/>
           <a:lstStyle/>
           <a:p>
-            <a:pPr algn="l" marL="342900" indent="-342900">
+            <a:pPr marL="342900" indent="-342900" algn="l">
               <a:lnSpc>
                 <a:spcPts val="2850"/>
               </a:lnSpc>
@@ -7295,12 +7017,6 @@
               </a:rPr>
               <a:t>Inherent quality:</a:t>
             </a:r>
-            <a:pPr algn="l" indent="0" marL="0">
-              <a:lnSpc>
-                <a:spcPts val="2850"/>
-              </a:lnSpc>
-              <a:buNone/>
-            </a:pPr>
             <a:r>
               <a:rPr lang="en-US" sz="1750" dirty="0">
                 <a:solidFill>
@@ -7362,7 +7078,7 @@
           <a:bodyPr wrap="none" lIns="0" tIns="0" rIns="0" bIns="0" rtlCol="0" anchor="t"/>
           <a:lstStyle/>
           <a:p>
-            <a:pPr algn="l" indent="0" marL="0">
+            <a:pPr marL="0" indent="0" algn="l">
               <a:lnSpc>
                 <a:spcPts val="4450"/>
               </a:lnSpc>
@@ -7404,7 +7120,7 @@
           <a:bodyPr wrap="square" lIns="0" tIns="0" rIns="0" bIns="0" rtlCol="0" anchor="t"/>
           <a:lstStyle/>
           <a:p>
-            <a:pPr algn="l" indent="0" marL="0">
+            <a:pPr marL="0" indent="0" algn="l">
               <a:lnSpc>
                 <a:spcPts val="2850"/>
               </a:lnSpc>
@@ -7421,12 +7137,6 @@
               </a:rPr>
               <a:t>5. </a:t>
             </a:r>
-            <a:pPr algn="l" indent="0" marL="0">
-              <a:lnSpc>
-                <a:spcPts val="2850"/>
-              </a:lnSpc>
-              <a:buNone/>
-            </a:pPr>
             <a:r>
               <a:rPr lang="en-US" sz="1750" b="1" dirty="0">
                 <a:solidFill>
@@ -7438,12 +7148,6 @@
               </a:rPr>
               <a:t>Maintenance Personnel:</a:t>
             </a:r>
-            <a:pPr algn="l" indent="0" marL="0">
-              <a:lnSpc>
-                <a:spcPts val="2850"/>
-              </a:lnSpc>
-              <a:buNone/>
-            </a:pPr>
             <a:r>
               <a:rPr lang="en-US" sz="1750" dirty="0">
                 <a:solidFill>
@@ -7480,7 +7184,7 @@
           <a:bodyPr wrap="square" lIns="0" tIns="0" rIns="0" bIns="0" rtlCol="0" anchor="t"/>
           <a:lstStyle/>
           <a:p>
-            <a:pPr algn="l" marL="342900" indent="-342900">
+            <a:pPr marL="342900" indent="-342900" algn="l">
               <a:lnSpc>
                 <a:spcPts val="2850"/>
               </a:lnSpc>
@@ -7498,12 +7202,6 @@
               </a:rPr>
               <a:t>Staff turnover:</a:t>
             </a:r>
-            <a:pPr algn="l" indent="0" marL="0">
-              <a:lnSpc>
-                <a:spcPts val="2850"/>
-              </a:lnSpc>
-              <a:buNone/>
-            </a:pPr>
             <a:r>
               <a:rPr lang="en-US" sz="1750" dirty="0">
                 <a:solidFill>
@@ -7540,7 +7238,7 @@
           <a:bodyPr wrap="square" lIns="0" tIns="0" rIns="0" bIns="0" rtlCol="0" anchor="t"/>
           <a:lstStyle/>
           <a:p>
-            <a:pPr algn="l" marL="342900" indent="-342900">
+            <a:pPr marL="342900" indent="-342900" algn="l">
               <a:lnSpc>
                 <a:spcPts val="2850"/>
               </a:lnSpc>
@@ -7558,12 +7256,6 @@
               </a:rPr>
               <a:t>Domain expertise</a:t>
             </a:r>
-            <a:pPr algn="l" indent="0" marL="0">
-              <a:lnSpc>
-                <a:spcPts val="2850"/>
-              </a:lnSpc>
-              <a:buNone/>
-            </a:pPr>
             <a:r>
               <a:rPr lang="en-US" sz="1750" dirty="0">
                 <a:solidFill>
@@ -7625,7 +7317,7 @@
           <a:bodyPr wrap="none" lIns="0" tIns="0" rIns="0" bIns="0" rtlCol="0" anchor="t"/>
           <a:lstStyle/>
           <a:p>
-            <a:pPr algn="l" indent="0" marL="0">
+            <a:pPr marL="0" indent="0" algn="l">
               <a:lnSpc>
                 <a:spcPts val="4450"/>
               </a:lnSpc>
@@ -7667,7 +7359,7 @@
           <a:bodyPr wrap="square" lIns="0" tIns="0" rIns="0" bIns="0" rtlCol="0" anchor="t"/>
           <a:lstStyle/>
           <a:p>
-            <a:pPr algn="l" marL="342900" indent="-342900">
+            <a:pPr marL="342900" indent="-342900" algn="l">
               <a:lnSpc>
                 <a:spcPts val="2850"/>
               </a:lnSpc>
@@ -7685,12 +7377,6 @@
               </a:rPr>
               <a:t>Working practices</a:t>
             </a:r>
-            <a:pPr algn="l" indent="0" marL="0">
-              <a:lnSpc>
-                <a:spcPts val="2850"/>
-              </a:lnSpc>
-              <a:buNone/>
-            </a:pPr>
             <a:r>
               <a:rPr lang="en-US" sz="1750" dirty="0">
                 <a:solidFill>
@@ -7727,7 +7413,7 @@
           <a:bodyPr wrap="square" lIns="0" tIns="0" rIns="0" bIns="0" rtlCol="0" anchor="t"/>
           <a:lstStyle/>
           <a:p>
-            <a:pPr algn="l" indent="0" marL="0">
+            <a:pPr marL="0" indent="0" algn="l">
               <a:lnSpc>
                 <a:spcPts val="3300"/>
               </a:lnSpc>
@@ -7794,7 +7480,7 @@
           <a:bodyPr wrap="none" lIns="0" tIns="0" rIns="0" bIns="0" rtlCol="0" anchor="t"/>
           <a:lstStyle/>
           <a:p>
-            <a:pPr algn="l" indent="0" marL="0">
+            <a:pPr marL="0" indent="0" algn="l">
               <a:lnSpc>
                 <a:spcPts val="4450"/>
               </a:lnSpc>
@@ -7836,7 +7522,7 @@
           <a:bodyPr wrap="square" lIns="0" tIns="0" rIns="0" bIns="0" rtlCol="0" anchor="t"/>
           <a:lstStyle/>
           <a:p>
-            <a:pPr algn="l" indent="0" marL="0">
+            <a:pPr marL="0" indent="0" algn="l">
               <a:lnSpc>
                 <a:spcPts val="2850"/>
               </a:lnSpc>
@@ -7853,13 +7539,60 @@
               </a:rPr>
               <a:t>Relations Between Product and Environment: </a:t>
             </a:r>
-            <a:pPr algn="l" indent="0" marL="0">
+            <a:r>
+              <a:rPr lang="en-US" sz="1750" dirty="0">
+                <a:solidFill>
+                  <a:srgbClr val="272525"/>
+                </a:solidFill>
+                <a:latin typeface="Inter" pitchFamily="34" charset="0"/>
+                <a:ea typeface="Inter" pitchFamily="34" charset="-122"/>
+                <a:cs typeface="Inter" pitchFamily="34" charset="-120"/>
+              </a:rPr>
+              <a:t>A software product does not exist in a vacuum, rather it can be seen as an entity which is hosted by its organisational and operational environments.</a:t>
+            </a:r>
+            <a:endParaRPr lang="en-US" sz="1750" dirty="0"/>
+          </a:p>
+        </p:txBody>
+      </p:sp>
+      <p:sp>
+        <p:nvSpPr>
+          <p:cNvPr id="4" name="Text 2"/>
+          <p:cNvSpPr/>
+          <p:nvPr/>
+        </p:nvSpPr>
+        <p:spPr>
+          <a:xfrm>
+            <a:off x="793790" y="4080748"/>
+            <a:ext cx="13042821" cy="725805"/>
+          </a:xfrm>
+          <a:prstGeom prst="rect">
+            <a:avLst/>
+          </a:prstGeom>
+          <a:noFill/>
+          <a:ln/>
+        </p:spPr>
+        <p:txBody>
+          <a:bodyPr wrap="square" lIns="0" tIns="0" rIns="0" bIns="0" rtlCol="0" anchor="t"/>
+          <a:lstStyle/>
+          <a:p>
+            <a:pPr marL="0" indent="0" algn="l">
               <a:lnSpc>
                 <a:spcPts val="2850"/>
               </a:lnSpc>
               <a:buNone/>
             </a:pPr>
             <a:r>
+              <a:rPr lang="en-US" sz="1750" b="1" dirty="0">
+                <a:solidFill>
+                  <a:srgbClr val="272525"/>
+                </a:solidFill>
+                <a:latin typeface="Inter" pitchFamily="34" charset="0"/>
+                <a:ea typeface="Inter" pitchFamily="34" charset="-122"/>
+                <a:cs typeface="Inter" pitchFamily="34" charset="-120"/>
+              </a:rPr>
+              <a:t>Relation between product and user:</a:t>
+            </a:r>
+            <a:r>
               <a:rPr lang="en-US" sz="1750" dirty="0">
                 <a:solidFill>
                   <a:srgbClr val="272525"/>
@@ -7868,7 +7601,7 @@
                 <a:ea typeface="Inter" pitchFamily="34" charset="-122"/>
                 <a:cs typeface="Inter" pitchFamily="34" charset="-120"/>
               </a:rPr>
-              <a:t>A software product does not exist in a vacuum, rather it can be seen as an entity which is hosted by its organisational and operational environments.</a:t>
+              <a:t> One of the objectives of a software product is to serve the needs of its users. The needs of the users change all the time and thus the product needs to adapt.</a:t>
             </a:r>
             <a:endParaRPr lang="en-US" sz="1750" dirty="0"/>
           </a:p>
@@ -7876,14 +7609,14 @@
       </p:sp>
       <p:sp>
         <p:nvSpPr>
-          <p:cNvPr id="4" name="Text 2"/>
-          <p:cNvSpPr/>
-          <p:nvPr/>
-        </p:nvSpPr>
-        <p:spPr>
-          <a:xfrm>
-            <a:off x="793790" y="4080748"/>
-            <a:ext cx="13042821" cy="725805"/>
+          <p:cNvPr id="5" name="Text 3"/>
+          <p:cNvSpPr/>
+          <p:nvPr/>
+        </p:nvSpPr>
+        <p:spPr>
+          <a:xfrm>
+            <a:off x="793790" y="5061704"/>
+            <a:ext cx="13042821" cy="1088708"/>
           </a:xfrm>
           <a:prstGeom prst="rect">
             <a:avLst/>
@@ -7895,7 +7628,7 @@
           <a:bodyPr wrap="square" lIns="0" tIns="0" rIns="0" bIns="0" rtlCol="0" anchor="t"/>
           <a:lstStyle/>
           <a:p>
-            <a:pPr algn="l" indent="0" marL="0">
+            <a:pPr marL="0" indent="0" algn="l">
               <a:lnSpc>
                 <a:spcPts val="2850"/>
               </a:lnSpc>
@@ -7910,73 +7643,8 @@
                 <a:ea typeface="Inter" pitchFamily="34" charset="-122"/>
                 <a:cs typeface="Inter" pitchFamily="34" charset="-120"/>
               </a:rPr>
-              <a:t>Relation between product and user:</a:t>
-            </a:r>
-            <a:pPr algn="l" indent="0" marL="0">
-              <a:lnSpc>
-                <a:spcPts val="2850"/>
-              </a:lnSpc>
-              <a:buNone/>
-            </a:pPr>
-            <a:r>
-              <a:rPr lang="en-US" sz="1750" dirty="0">
-                <a:solidFill>
-                  <a:srgbClr val="272525"/>
-                </a:solidFill>
-                <a:latin typeface="Inter" pitchFamily="34" charset="0"/>
-                <a:ea typeface="Inter" pitchFamily="34" charset="-122"/>
-                <a:cs typeface="Inter" pitchFamily="34" charset="-120"/>
-              </a:rPr>
-              <a:t> One of the objectives of a software product is to serve the needs of its users. The needs of the users change all the time and thus the product needs to adapt.</a:t>
-            </a:r>
-            <a:endParaRPr lang="en-US" sz="1750" dirty="0"/>
-          </a:p>
-        </p:txBody>
-      </p:sp>
-      <p:sp>
-        <p:nvSpPr>
-          <p:cNvPr id="5" name="Text 3"/>
-          <p:cNvSpPr/>
-          <p:nvPr/>
-        </p:nvSpPr>
-        <p:spPr>
-          <a:xfrm>
-            <a:off x="793790" y="5061704"/>
-            <a:ext cx="13042821" cy="1088708"/>
-          </a:xfrm>
-          <a:prstGeom prst="rect">
-            <a:avLst/>
-          </a:prstGeom>
-          <a:noFill/>
-          <a:ln/>
-        </p:spPr>
-        <p:txBody>
-          <a:bodyPr wrap="square" lIns="0" tIns="0" rIns="0" bIns="0" rtlCol="0" anchor="t"/>
-          <a:lstStyle/>
-          <a:p>
-            <a:pPr algn="l" indent="0" marL="0">
-              <a:lnSpc>
-                <a:spcPts val="2850"/>
-              </a:lnSpc>
-              <a:buNone/>
-            </a:pPr>
-            <a:r>
-              <a:rPr lang="en-US" sz="1750" b="1" dirty="0">
-                <a:solidFill>
-                  <a:srgbClr val="272525"/>
-                </a:solidFill>
-                <a:latin typeface="Inter" pitchFamily="34" charset="0"/>
-                <a:ea typeface="Inter" pitchFamily="34" charset="-122"/>
-                <a:cs typeface="Inter" pitchFamily="34" charset="-120"/>
-              </a:rPr>
               <a:t>Interaction between personnel and product:</a:t>
             </a:r>
-            <a:pPr algn="l" indent="0" marL="0">
-              <a:lnSpc>
-                <a:spcPts val="2850"/>
-              </a:lnSpc>
-              <a:buNone/>
-            </a:pPr>
             <a:r>
               <a:rPr lang="en-US" sz="1750" dirty="0">
                 <a:solidFill>
@@ -8019,14 +7687,14 @@
       </p:grpSpPr>
       <p:pic>
         <p:nvPicPr>
-          <p:cNvPr id="2" name="Image 0" descr="preencoded.png">    </p:cNvPr>
+          <p:cNvPr id="2" name="Image 0" descr="preencoded.png"/>
           <p:cNvPicPr>
             <a:picLocks noChangeAspect="1"/>
           </p:cNvPicPr>
           <p:nvPr/>
         </p:nvPicPr>
         <p:blipFill>
-          <a:blip r:embed="rId1"/>
+          <a:blip r:embed="rId3"/>
           <a:stretch>
             <a:fillRect/>
           </a:stretch>
@@ -8068,14 +7736,14 @@
       </p:grpSpPr>
       <p:pic>
         <p:nvPicPr>
-          <p:cNvPr id="2" name="Image 0" descr="preencoded.png">    </p:cNvPr>
+          <p:cNvPr id="2" name="Image 0" descr="preencoded.png"/>
           <p:cNvPicPr>
             <a:picLocks noChangeAspect="1"/>
           </p:cNvPicPr>
           <p:nvPr/>
         </p:nvPicPr>
         <p:blipFill>
-          <a:blip r:embed="rId1"/>
+          <a:blip r:embed="rId3"/>
           <a:stretch>
             <a:fillRect/>
           </a:stretch>
@@ -8133,7 +7801,7 @@
           <a:bodyPr wrap="none" lIns="0" tIns="0" rIns="0" bIns="0" rtlCol="0" anchor="t"/>
           <a:lstStyle/>
           <a:p>
-            <a:pPr algn="l" indent="0" marL="0">
+            <a:pPr marL="0" indent="0" algn="l">
               <a:lnSpc>
                 <a:spcPts val="5550"/>
               </a:lnSpc>
@@ -8200,7 +7868,7 @@
           <a:bodyPr wrap="none" lIns="0" tIns="0" rIns="0" bIns="0" rtlCol="0" anchor="t"/>
           <a:lstStyle/>
           <a:p>
-            <a:pPr algn="l" indent="0" marL="0">
+            <a:pPr marL="0" indent="0" algn="l">
               <a:lnSpc>
                 <a:spcPts val="4450"/>
               </a:lnSpc>
@@ -8242,7 +7910,7 @@
           <a:bodyPr wrap="none" lIns="0" tIns="0" rIns="0" bIns="0" rtlCol="0" anchor="t"/>
           <a:lstStyle/>
           <a:p>
-            <a:pPr algn="l" marL="342900" indent="-342900">
+            <a:pPr marL="342900" indent="-342900" algn="l">
               <a:lnSpc>
                 <a:spcPts val="2850"/>
               </a:lnSpc>
@@ -8285,7 +7953,7 @@
           <a:bodyPr wrap="none" lIns="0" tIns="0" rIns="0" bIns="0" rtlCol="0" anchor="t"/>
           <a:lstStyle/>
           <a:p>
-            <a:pPr algn="l" marL="342900" indent="-342900">
+            <a:pPr marL="342900" indent="-342900" algn="l">
               <a:lnSpc>
                 <a:spcPts val="2850"/>
               </a:lnSpc>
@@ -8328,7 +7996,7 @@
           <a:bodyPr wrap="none" lIns="0" tIns="0" rIns="0" bIns="0" rtlCol="0" anchor="t"/>
           <a:lstStyle/>
           <a:p>
-            <a:pPr algn="l" lvl="1" marL="685800" indent="-342900">
+            <a:pPr marL="685800" lvl="1" indent="-342900" algn="l">
               <a:lnSpc>
                 <a:spcPts val="2850"/>
               </a:lnSpc>
@@ -8371,7 +8039,7 @@
           <a:bodyPr wrap="none" lIns="0" tIns="0" rIns="0" bIns="0" rtlCol="0" anchor="t"/>
           <a:lstStyle/>
           <a:p>
-            <a:pPr algn="l" lvl="1" marL="685800" indent="-342900">
+            <a:pPr marL="685800" lvl="1" indent="-342900" algn="l">
               <a:lnSpc>
                 <a:spcPts val="2850"/>
               </a:lnSpc>
@@ -8414,7 +8082,7 @@
           <a:bodyPr wrap="none" lIns="0" tIns="0" rIns="0" bIns="0" rtlCol="0" anchor="t"/>
           <a:lstStyle/>
           <a:p>
-            <a:pPr algn="l" lvl="2" marL="1028700" indent="-342900">
+            <a:pPr marL="1028700" lvl="2" indent="-342900" algn="l">
               <a:lnSpc>
                 <a:spcPts val="2850"/>
               </a:lnSpc>
@@ -8457,7 +8125,7 @@
           <a:bodyPr wrap="none" lIns="0" tIns="0" rIns="0" bIns="0" rtlCol="0" anchor="t"/>
           <a:lstStyle/>
           <a:p>
-            <a:pPr algn="l" lvl="1" marL="685800" indent="-342900">
+            <a:pPr marL="685800" lvl="1" indent="-342900" algn="l">
               <a:lnSpc>
                 <a:spcPts val="2850"/>
               </a:lnSpc>
@@ -8500,7 +8168,7 @@
           <a:bodyPr wrap="none" lIns="0" tIns="0" rIns="0" bIns="0" rtlCol="0" anchor="t"/>
           <a:lstStyle/>
           <a:p>
-            <a:pPr algn="l" lvl="2" marL="1028700" indent="-342900">
+            <a:pPr marL="1028700" lvl="2" indent="-342900" algn="l">
               <a:lnSpc>
                 <a:spcPts val="2850"/>
               </a:lnSpc>
@@ -8543,7 +8211,7 @@
           <a:bodyPr wrap="none" lIns="0" tIns="0" rIns="0" bIns="0" rtlCol="0" anchor="t"/>
           <a:lstStyle/>
           <a:p>
-            <a:pPr algn="l" lvl="1" marL="685800" indent="-342900">
+            <a:pPr marL="685800" lvl="1" indent="-342900" algn="l">
               <a:lnSpc>
                 <a:spcPts val="2850"/>
               </a:lnSpc>
@@ -8586,7 +8254,7 @@
           <a:bodyPr wrap="square" lIns="0" tIns="0" rIns="0" bIns="0" rtlCol="0" anchor="t"/>
           <a:lstStyle/>
           <a:p>
-            <a:pPr algn="l" lvl="2" marL="1028700" indent="-342900">
+            <a:pPr marL="1028700" lvl="2" indent="-342900" algn="l">
               <a:lnSpc>
                 <a:spcPts val="2850"/>
               </a:lnSpc>
@@ -8654,7 +8322,7 @@
           <a:bodyPr wrap="none" lIns="0" tIns="0" rIns="0" bIns="0" rtlCol="0" anchor="t"/>
           <a:lstStyle/>
           <a:p>
-            <a:pPr algn="l" indent="0" marL="0">
+            <a:pPr marL="0" indent="0" algn="l">
               <a:lnSpc>
                 <a:spcPts val="5550"/>
               </a:lnSpc>
@@ -8696,7 +8364,7 @@
           <a:bodyPr wrap="square" lIns="0" tIns="0" rIns="0" bIns="0" rtlCol="0" anchor="t"/>
           <a:lstStyle/>
           <a:p>
-            <a:pPr algn="l" indent="0" marL="0">
+            <a:pPr marL="0" indent="0" algn="l">
               <a:lnSpc>
                 <a:spcPts val="2850"/>
               </a:lnSpc>
@@ -8713,13 +8381,71 @@
               </a:rPr>
               <a:t>The </a:t>
             </a:r>
-            <a:pPr algn="l" indent="0" marL="0">
+            <a:r>
+              <a:rPr lang="en-US" sz="1750" b="1" dirty="0">
+                <a:solidFill>
+                  <a:srgbClr val="272525"/>
+                </a:solidFill>
+                <a:latin typeface="Inter" pitchFamily="34" charset="0"/>
+                <a:ea typeface="Inter" pitchFamily="34" charset="-122"/>
+                <a:cs typeface="Inter" pitchFamily="34" charset="-120"/>
+              </a:rPr>
+              <a:t>Software Life Cycle</a:t>
+            </a:r>
+            <a:r>
+              <a:rPr lang="en-US" sz="1750" dirty="0">
+                <a:solidFill>
+                  <a:srgbClr val="272525"/>
+                </a:solidFill>
+                <a:latin typeface="Inter" pitchFamily="34" charset="0"/>
+                <a:ea typeface="Inter" pitchFamily="34" charset="-122"/>
+                <a:cs typeface="Inter" pitchFamily="34" charset="-120"/>
+              </a:rPr>
+              <a:t> refers to the stages a software product goes through from its initial conception to its final retirement. These stages typically include requirements analysis, design, implementation, testing, deployment, and maintenance.</a:t>
+            </a:r>
+            <a:endParaRPr lang="en-US" sz="1750" dirty="0"/>
+          </a:p>
+        </p:txBody>
+      </p:sp>
+      <p:sp>
+        <p:nvSpPr>
+          <p:cNvPr id="4" name="Text 2"/>
+          <p:cNvSpPr/>
+          <p:nvPr/>
+        </p:nvSpPr>
+        <p:spPr>
+          <a:xfrm>
+            <a:off x="793790" y="4514493"/>
+            <a:ext cx="13042821" cy="725805"/>
+          </a:xfrm>
+          <a:prstGeom prst="rect">
+            <a:avLst/>
+          </a:prstGeom>
+          <a:noFill/>
+          <a:ln/>
+        </p:spPr>
+        <p:txBody>
+          <a:bodyPr wrap="square" lIns="0" tIns="0" rIns="0" bIns="0" rtlCol="0" anchor="t"/>
+          <a:lstStyle/>
+          <a:p>
+            <a:pPr marL="0" indent="0" algn="l">
               <a:lnSpc>
                 <a:spcPts val="2850"/>
               </a:lnSpc>
               <a:buNone/>
             </a:pPr>
             <a:r>
+              <a:rPr lang="en-US" sz="1750" dirty="0">
+                <a:solidFill>
+                  <a:srgbClr val="272525"/>
+                </a:solidFill>
+                <a:latin typeface="Inter" pitchFamily="34" charset="0"/>
+                <a:ea typeface="Inter" pitchFamily="34" charset="-122"/>
+                <a:cs typeface="Inter" pitchFamily="34" charset="-120"/>
+              </a:rPr>
+              <a:t>The </a:t>
+            </a:r>
+            <a:r>
               <a:rPr lang="en-US" sz="1750" b="1" dirty="0">
                 <a:solidFill>
                   <a:srgbClr val="272525"/>
@@ -8728,9 +8454,45 @@
                 <a:ea typeface="Inter" pitchFamily="34" charset="-122"/>
                 <a:cs typeface="Inter" pitchFamily="34" charset="-120"/>
               </a:rPr>
-              <a:t>Software Life Cycle</a:t>
-            </a:r>
-            <a:pPr algn="l" indent="0" marL="0">
+              <a:t>Software Process</a:t>
+            </a:r>
+            <a:r>
+              <a:rPr lang="en-US" sz="1750" dirty="0">
+                <a:solidFill>
+                  <a:srgbClr val="272525"/>
+                </a:solidFill>
+                <a:latin typeface="Inter" pitchFamily="34" charset="0"/>
+                <a:ea typeface="Inter" pitchFamily="34" charset="-122"/>
+                <a:cs typeface="Inter" pitchFamily="34" charset="-120"/>
+              </a:rPr>
+              <a:t> is the set of activities, methods, and practices used to develop and maintain software. It defines how the software life cycle stages are executed and managed to ensure quality and efficiency.</a:t>
+            </a:r>
+            <a:endParaRPr lang="en-US" sz="1750" dirty="0"/>
+          </a:p>
+        </p:txBody>
+      </p:sp>
+      <p:sp>
+        <p:nvSpPr>
+          <p:cNvPr id="5" name="Text 3"/>
+          <p:cNvSpPr/>
+          <p:nvPr/>
+        </p:nvSpPr>
+        <p:spPr>
+          <a:xfrm>
+            <a:off x="793790" y="5495449"/>
+            <a:ext cx="13042821" cy="725805"/>
+          </a:xfrm>
+          <a:prstGeom prst="rect">
+            <a:avLst/>
+          </a:prstGeom>
+          <a:noFill/>
+          <a:ln/>
+        </p:spPr>
+        <p:txBody>
+          <a:bodyPr wrap="square" lIns="0" tIns="0" rIns="0" bIns="0" rtlCol="0" anchor="t"/>
+          <a:lstStyle/>
+          <a:p>
+            <a:pPr marL="0" indent="0" algn="l">
               <a:lnSpc>
                 <a:spcPts val="2850"/>
               </a:lnSpc>
@@ -8745,39 +8507,19 @@
                 <a:ea typeface="Inter" pitchFamily="34" charset="-122"/>
                 <a:cs typeface="Inter" pitchFamily="34" charset="-120"/>
               </a:rPr>
-              <a:t> refers to the stages a software product goes through from its initial conception to its final retirement. These stages typically include requirements analysis, design, implementation, testing, deployment, and maintenance.</a:t>
-            </a:r>
-            <a:endParaRPr lang="en-US" sz="1750" dirty="0"/>
-          </a:p>
-        </p:txBody>
-      </p:sp>
-      <p:sp>
-        <p:nvSpPr>
-          <p:cNvPr id="4" name="Text 2"/>
-          <p:cNvSpPr/>
-          <p:nvPr/>
-        </p:nvSpPr>
-        <p:spPr>
-          <a:xfrm>
-            <a:off x="793790" y="4514493"/>
-            <a:ext cx="13042821" cy="725805"/>
-          </a:xfrm>
-          <a:prstGeom prst="rect">
-            <a:avLst/>
-          </a:prstGeom>
-          <a:noFill/>
-          <a:ln/>
-        </p:spPr>
-        <p:txBody>
-          <a:bodyPr wrap="square" lIns="0" tIns="0" rIns="0" bIns="0" rtlCol="0" anchor="t"/>
-          <a:lstStyle/>
-          <a:p>
-            <a:pPr algn="l" indent="0" marL="0">
-              <a:lnSpc>
-                <a:spcPts val="2850"/>
-              </a:lnSpc>
-              <a:buNone/>
-            </a:pPr>
+              <a:t>While the software life cycle describes </a:t>
+            </a:r>
+            <a:r>
+              <a:rPr lang="en-US" sz="1750" i="1" dirty="0">
+                <a:solidFill>
+                  <a:srgbClr val="272525"/>
+                </a:solidFill>
+                <a:latin typeface="Inter" pitchFamily="34" charset="0"/>
+                <a:ea typeface="Inter" pitchFamily="34" charset="-122"/>
+                <a:cs typeface="Inter" pitchFamily="34" charset="-120"/>
+              </a:rPr>
+              <a:t>what</a:t>
+            </a:r>
             <a:r>
               <a:rPr lang="en-US" sz="1750" dirty="0">
                 <a:solidFill>
@@ -8787,90 +8529,8 @@
                 <a:ea typeface="Inter" pitchFamily="34" charset="-122"/>
                 <a:cs typeface="Inter" pitchFamily="34" charset="-120"/>
               </a:rPr>
-              <a:t>The </a:t>
-            </a:r>
-            <a:pPr algn="l" indent="0" marL="0">
-              <a:lnSpc>
-                <a:spcPts val="2850"/>
-              </a:lnSpc>
-              <a:buNone/>
-            </a:pPr>
-            <a:r>
-              <a:rPr lang="en-US" sz="1750" b="1" dirty="0">
-                <a:solidFill>
-                  <a:srgbClr val="272525"/>
-                </a:solidFill>
-                <a:latin typeface="Inter" pitchFamily="34" charset="0"/>
-                <a:ea typeface="Inter" pitchFamily="34" charset="-122"/>
-                <a:cs typeface="Inter" pitchFamily="34" charset="-120"/>
-              </a:rPr>
-              <a:t>Software Process</a:t>
-            </a:r>
-            <a:pPr algn="l" indent="0" marL="0">
-              <a:lnSpc>
-                <a:spcPts val="2850"/>
-              </a:lnSpc>
-              <a:buNone/>
-            </a:pPr>
-            <a:r>
-              <a:rPr lang="en-US" sz="1750" dirty="0">
-                <a:solidFill>
-                  <a:srgbClr val="272525"/>
-                </a:solidFill>
-                <a:latin typeface="Inter" pitchFamily="34" charset="0"/>
-                <a:ea typeface="Inter" pitchFamily="34" charset="-122"/>
-                <a:cs typeface="Inter" pitchFamily="34" charset="-120"/>
-              </a:rPr>
-              <a:t> is the set of activities, methods, and practices used to develop and maintain software. It defines how the software life cycle stages are executed and managed to ensure quality and efficiency.</a:t>
-            </a:r>
-            <a:endParaRPr lang="en-US" sz="1750" dirty="0"/>
-          </a:p>
-        </p:txBody>
-      </p:sp>
-      <p:sp>
-        <p:nvSpPr>
-          <p:cNvPr id="5" name="Text 3"/>
-          <p:cNvSpPr/>
-          <p:nvPr/>
-        </p:nvSpPr>
-        <p:spPr>
-          <a:xfrm>
-            <a:off x="793790" y="5495449"/>
-            <a:ext cx="13042821" cy="725805"/>
-          </a:xfrm>
-          <a:prstGeom prst="rect">
-            <a:avLst/>
-          </a:prstGeom>
-          <a:noFill/>
-          <a:ln/>
-        </p:spPr>
-        <p:txBody>
-          <a:bodyPr wrap="square" lIns="0" tIns="0" rIns="0" bIns="0" rtlCol="0" anchor="t"/>
-          <a:lstStyle/>
-          <a:p>
-            <a:pPr algn="l" indent="0" marL="0">
-              <a:lnSpc>
-                <a:spcPts val="2850"/>
-              </a:lnSpc>
-              <a:buNone/>
-            </a:pPr>
-            <a:r>
-              <a:rPr lang="en-US" sz="1750" dirty="0">
-                <a:solidFill>
-                  <a:srgbClr val="272525"/>
-                </a:solidFill>
-                <a:latin typeface="Inter" pitchFamily="34" charset="0"/>
-                <a:ea typeface="Inter" pitchFamily="34" charset="-122"/>
-                <a:cs typeface="Inter" pitchFamily="34" charset="-120"/>
-              </a:rPr>
-              <a:t>While the software life cycle describes </a:t>
-            </a:r>
-            <a:pPr algn="l" indent="0" marL="0">
-              <a:lnSpc>
-                <a:spcPts val="2850"/>
-              </a:lnSpc>
-              <a:buNone/>
-            </a:pPr>
+              <a:t> phases a software product experiences, the software process specifies </a:t>
+            </a:r>
             <a:r>
               <a:rPr lang="en-US" sz="1750" i="1" dirty="0">
                 <a:solidFill>
@@ -8880,48 +8540,8 @@
                 <a:ea typeface="Inter" pitchFamily="34" charset="-122"/>
                 <a:cs typeface="Inter" pitchFamily="34" charset="-120"/>
               </a:rPr>
-              <a:t>what</a:t>
-            </a:r>
-            <a:pPr algn="l" indent="0" marL="0">
-              <a:lnSpc>
-                <a:spcPts val="2850"/>
-              </a:lnSpc>
-              <a:buNone/>
-            </a:pPr>
-            <a:r>
-              <a:rPr lang="en-US" sz="1750" dirty="0">
-                <a:solidFill>
-                  <a:srgbClr val="272525"/>
-                </a:solidFill>
-                <a:latin typeface="Inter" pitchFamily="34" charset="0"/>
-                <a:ea typeface="Inter" pitchFamily="34" charset="-122"/>
-                <a:cs typeface="Inter" pitchFamily="34" charset="-120"/>
-              </a:rPr>
-              <a:t> phases a software product experiences, the software process specifies </a:t>
-            </a:r>
-            <a:pPr algn="l" indent="0" marL="0">
-              <a:lnSpc>
-                <a:spcPts val="2850"/>
-              </a:lnSpc>
-              <a:buNone/>
-            </a:pPr>
-            <a:r>
-              <a:rPr lang="en-US" sz="1750" i="1" dirty="0">
-                <a:solidFill>
-                  <a:srgbClr val="272525"/>
-                </a:solidFill>
-                <a:latin typeface="Inter" pitchFamily="34" charset="0"/>
-                <a:ea typeface="Inter" pitchFamily="34" charset="-122"/>
-                <a:cs typeface="Inter" pitchFamily="34" charset="-120"/>
-              </a:rPr>
               <a:t>how</a:t>
             </a:r>
-            <a:pPr algn="l" indent="0" marL="0">
-              <a:lnSpc>
-                <a:spcPts val="2850"/>
-              </a:lnSpc>
-              <a:buNone/>
-            </a:pPr>
             <a:r>
               <a:rPr lang="en-US" sz="1750" dirty="0">
                 <a:solidFill>
@@ -8983,7 +8603,7 @@
           <a:bodyPr wrap="none" lIns="0" tIns="0" rIns="0" bIns="0" rtlCol="0" anchor="t"/>
           <a:lstStyle/>
           <a:p>
-            <a:pPr algn="l" indent="0" marL="0">
+            <a:pPr marL="0" indent="0" algn="l">
               <a:lnSpc>
                 <a:spcPts val="5550"/>
               </a:lnSpc>
@@ -9025,7 +8645,7 @@
           <a:bodyPr wrap="square" lIns="0" tIns="0" rIns="0" bIns="0" rtlCol="0" anchor="t"/>
           <a:lstStyle/>
           <a:p>
-            <a:pPr algn="l" indent="0" marL="0">
+            <a:pPr marL="0" indent="0" algn="l">
               <a:lnSpc>
                 <a:spcPts val="2850"/>
               </a:lnSpc>
@@ -9067,7 +8687,7 @@
           <a:bodyPr wrap="square" lIns="0" tIns="0" rIns="0" bIns="0" rtlCol="0" anchor="t"/>
           <a:lstStyle/>
           <a:p>
-            <a:pPr algn="l" indent="0" marL="0">
+            <a:pPr marL="0" indent="0" algn="l">
               <a:lnSpc>
                 <a:spcPts val="2850"/>
               </a:lnSpc>
@@ -9134,7 +8754,7 @@
           <a:bodyPr wrap="none" lIns="0" tIns="0" rIns="0" bIns="0" rtlCol="0" anchor="t"/>
           <a:lstStyle/>
           <a:p>
-            <a:pPr algn="l" indent="0" marL="0">
+            <a:pPr marL="0" indent="0" algn="l">
               <a:lnSpc>
                 <a:spcPts val="3950"/>
               </a:lnSpc>
@@ -9176,7 +8796,7 @@
           <a:bodyPr wrap="square" lIns="0" tIns="0" rIns="0" bIns="0" rtlCol="0" anchor="t"/>
           <a:lstStyle/>
           <a:p>
-            <a:pPr algn="l" indent="0" marL="0">
+            <a:pPr marL="0" indent="0" algn="l">
               <a:lnSpc>
                 <a:spcPts val="2000"/>
               </a:lnSpc>
@@ -9193,12 +8813,6 @@
               </a:rPr>
               <a:t>Software Maintenance is an important phase of Software Development Life Cycle (SDLC), and it is implemented in the system through a proper software maintenance process, known as </a:t>
             </a:r>
-            <a:pPr algn="l" indent="0" marL="0">
-              <a:lnSpc>
-                <a:spcPts val="2000"/>
-              </a:lnSpc>
-              <a:buNone/>
-            </a:pPr>
             <a:r>
               <a:rPr lang="en-US" sz="1250" b="1" dirty="0">
                 <a:solidFill>
@@ -9210,12 +8824,6 @@
               </a:rPr>
               <a:t>Software Maintenance Life Cycle (SMLC)</a:t>
             </a:r>
-            <a:pPr algn="l" indent="0" marL="0">
-              <a:lnSpc>
-                <a:spcPts val="2000"/>
-              </a:lnSpc>
-              <a:buNone/>
-            </a:pPr>
             <a:r>
               <a:rPr lang="en-US" sz="1250" dirty="0">
                 <a:solidFill>
@@ -9252,13 +8860,13 @@
           <a:bodyPr wrap="square" lIns="0" tIns="0" rIns="0" bIns="0" rtlCol="0" anchor="t"/>
           <a:lstStyle/>
           <a:p>
-            <a:pPr algn="l" marL="342900" indent="-342900">
+            <a:pPr marL="342900" indent="-342900" algn="l">
               <a:lnSpc>
                 <a:spcPts val="2000"/>
               </a:lnSpc>
               <a:buSzPct val="100000"/>
               <a:buFont typeface="+mj-lt"/>
-              <a:buAutoNum type="arabicPeriod" startAt="1"/>
+              <a:buAutoNum type="arabicPeriod"/>
             </a:pPr>
             <a:r>
               <a:rPr lang="en-US" sz="1250" b="1" dirty="0">
@@ -9271,12 +8879,6 @@
               </a:rPr>
               <a:t>Identification Phase: </a:t>
             </a:r>
-            <a:pPr algn="l" indent="0" marL="0">
-              <a:lnSpc>
-                <a:spcPts val="2000"/>
-              </a:lnSpc>
-              <a:buNone/>
-            </a:pPr>
             <a:r>
               <a:rPr lang="en-US" sz="1250" dirty="0">
                 <a:solidFill>
@@ -9313,7 +8915,7 @@
           <a:bodyPr wrap="square" lIns="0" tIns="0" rIns="0" bIns="0" rtlCol="0" anchor="t"/>
           <a:lstStyle/>
           <a:p>
-            <a:pPr algn="l" marL="342900" indent="-342900">
+            <a:pPr marL="342900" indent="-342900" algn="l">
               <a:lnSpc>
                 <a:spcPts val="2000"/>
               </a:lnSpc>
@@ -9332,12 +8934,6 @@
               </a:rPr>
               <a:t> </a:t>
             </a:r>
-            <a:pPr algn="l" indent="0" marL="0">
-              <a:lnSpc>
-                <a:spcPts val="2000"/>
-              </a:lnSpc>
-              <a:buNone/>
-            </a:pPr>
             <a:r>
               <a:rPr lang="en-US" sz="1250" b="1" dirty="0">
                 <a:solidFill>
@@ -9349,12 +8945,6 @@
               </a:rPr>
               <a:t>Analysis Phase: </a:t>
             </a:r>
-            <a:pPr algn="l" indent="0" marL="0">
-              <a:lnSpc>
-                <a:spcPts val="2000"/>
-              </a:lnSpc>
-              <a:buNone/>
-            </a:pPr>
             <a:r>
               <a:rPr lang="en-US" sz="1250" dirty="0">
                 <a:solidFill>
@@ -9391,7 +8981,7 @@
           <a:bodyPr wrap="square" lIns="0" tIns="0" rIns="0" bIns="0" rtlCol="0" anchor="t"/>
           <a:lstStyle/>
           <a:p>
-            <a:pPr algn="l" marL="342900" indent="-342900">
+            <a:pPr marL="342900" indent="-342900" algn="l">
               <a:lnSpc>
                 <a:spcPts val="2000"/>
               </a:lnSpc>
@@ -9410,12 +9000,6 @@
               </a:rPr>
               <a:t>Design Phase: </a:t>
             </a:r>
-            <a:pPr algn="l" indent="0" marL="0">
-              <a:lnSpc>
-                <a:spcPts val="2000"/>
-              </a:lnSpc>
-              <a:buNone/>
-            </a:pPr>
             <a:r>
               <a:rPr lang="en-US" sz="1250" dirty="0">
                 <a:solidFill>
@@ -9452,7 +9036,7 @@
           <a:bodyPr wrap="square" lIns="0" tIns="0" rIns="0" bIns="0" rtlCol="0" anchor="t"/>
           <a:lstStyle/>
           <a:p>
-            <a:pPr algn="l" marL="342900" indent="-342900">
+            <a:pPr marL="342900" indent="-342900" algn="l">
               <a:lnSpc>
                 <a:spcPts val="2000"/>
               </a:lnSpc>
@@ -9471,12 +9055,6 @@
               </a:rPr>
               <a:t>Implementation Phase: </a:t>
             </a:r>
-            <a:pPr algn="l" indent="0" marL="0">
-              <a:lnSpc>
-                <a:spcPts val="2000"/>
-              </a:lnSpc>
-              <a:buNone/>
-            </a:pPr>
             <a:r>
               <a:rPr lang="en-US" sz="1250" dirty="0">
                 <a:solidFill>
@@ -9513,7 +9091,7 @@
           <a:bodyPr wrap="square" lIns="0" tIns="0" rIns="0" bIns="0" rtlCol="0" anchor="t"/>
           <a:lstStyle/>
           <a:p>
-            <a:pPr algn="l" marL="342900" indent="-342900">
+            <a:pPr marL="342900" indent="-342900" algn="l">
               <a:lnSpc>
                 <a:spcPts val="2000"/>
               </a:lnSpc>
@@ -9532,12 +9110,6 @@
               </a:rPr>
               <a:t>System Testing Phase:  </a:t>
             </a:r>
-            <a:pPr algn="l" indent="0" marL="0">
-              <a:lnSpc>
-                <a:spcPts val="2000"/>
-              </a:lnSpc>
-              <a:buNone/>
-            </a:pPr>
             <a:r>
               <a:rPr lang="en-US" sz="1250" u="sng" dirty="0">
                 <a:solidFill>
@@ -9546,7 +9118,7 @@
                 <a:latin typeface="Inter" pitchFamily="34" charset="0"/>
                 <a:ea typeface="Inter" pitchFamily="34" charset="-122"/>
                 <a:cs typeface="Inter" pitchFamily="34" charset="-120"/>
-                <a:hlinkClick r:id="rId1" invalidUrl="" action="" tgtFrame="" tooltip="" history="1" highlightClick="0" endSnd="0">
+                <a:hlinkClick r:id="rId3">
                   <a:extLst>
                     <a:ext uri="{A12FA001-AC4F-418D-AE19-62706E023703}">
                       <ahyp:hlinkClr xmlns:ahyp="http://schemas.microsoft.com/office/drawing/2018/hyperlinkcolor" val="tx"/>
@@ -9556,12 +9128,6 @@
               </a:rPr>
               <a:t>​</a:t>
             </a:r>
-            <a:pPr algn="l" indent="0" marL="0">
-              <a:lnSpc>
-                <a:spcPts val="2000"/>
-              </a:lnSpc>
-              <a:buNone/>
-            </a:pPr>
             <a:r>
               <a:rPr lang="en-US" sz="1250" dirty="0">
                 <a:solidFill>
@@ -9573,12 +9139,6 @@
               </a:rPr>
               <a:t>Regression testing is performed on the modified system to ensure that no defect, error or bug is left undetected. Furthermore, it validates that no new faults are introduced in the software as a result of maintenance activity. Integration testing</a:t>
             </a:r>
-            <a:pPr algn="l" indent="0" marL="0">
-              <a:lnSpc>
-                <a:spcPts val="2000"/>
-              </a:lnSpc>
-              <a:buNone/>
-            </a:pPr>
             <a:r>
               <a:rPr lang="en-US" sz="1250" u="sng" dirty="0">
                 <a:solidFill>
@@ -9587,7 +9147,7 @@
                 <a:latin typeface="Inter" pitchFamily="34" charset="0"/>
                 <a:ea typeface="Inter" pitchFamily="34" charset="-122"/>
                 <a:cs typeface="Inter" pitchFamily="34" charset="-120"/>
-                <a:hlinkClick r:id="rId2" invalidUrl="" action="" tgtFrame="" tooltip="" history="1" highlightClick="0" endSnd="0">
+                <a:hlinkClick r:id="rId4">
                   <a:extLst>
                     <a:ext uri="{A12FA001-AC4F-418D-AE19-62706E023703}">
                       <ahyp:hlinkClr xmlns:ahyp="http://schemas.microsoft.com/office/drawing/2018/hyperlinkcolor" val="tx"/>
@@ -9597,12 +9157,6 @@
               </a:rPr>
               <a:t>​</a:t>
             </a:r>
-            <a:pPr algn="l" indent="0" marL="0">
-              <a:lnSpc>
-                <a:spcPts val="2000"/>
-              </a:lnSpc>
-              <a:buNone/>
-            </a:pPr>
             <a:r>
               <a:rPr lang="en-US" sz="1250" dirty="0">
                 <a:solidFill>
@@ -9639,7 +9193,7 @@
           <a:bodyPr wrap="square" lIns="0" tIns="0" rIns="0" bIns="0" rtlCol="0" anchor="t"/>
           <a:lstStyle/>
           <a:p>
-            <a:pPr algn="l" marL="342900" indent="-342900">
+            <a:pPr marL="342900" indent="-342900" algn="l">
               <a:lnSpc>
                 <a:spcPts val="2000"/>
               </a:lnSpc>
@@ -9658,12 +9212,6 @@
               </a:rPr>
               <a:t>Acceptance Testing Phase: </a:t>
             </a:r>
-            <a:pPr algn="l" indent="0" marL="0">
-              <a:lnSpc>
-                <a:spcPts val="2000"/>
-              </a:lnSpc>
-              <a:buNone/>
-            </a:pPr>
             <a:r>
               <a:rPr lang="en-US" sz="1250" b="1" u="sng" dirty="0">
                 <a:solidFill>
@@ -9672,7 +9220,7 @@
                 <a:latin typeface="Inter" pitchFamily="34" charset="0"/>
                 <a:ea typeface="Inter" pitchFamily="34" charset="-122"/>
                 <a:cs typeface="Inter" pitchFamily="34" charset="-120"/>
-                <a:hlinkClick r:id="rId3" invalidUrl="" action="" tgtFrame="" tooltip="" history="1" highlightClick="0" endSnd="0">
+                <a:hlinkClick r:id="rId5">
                   <a:extLst>
                     <a:ext uri="{A12FA001-AC4F-418D-AE19-62706E023703}">
                       <ahyp:hlinkClr xmlns:ahyp="http://schemas.microsoft.com/office/drawing/2018/hyperlinkcolor" val="tx"/>
@@ -9682,12 +9230,6 @@
               </a:rPr>
               <a:t>A</a:t>
             </a:r>
-            <a:pPr algn="l" indent="0" marL="0">
-              <a:lnSpc>
-                <a:spcPts val="2000"/>
-              </a:lnSpc>
-              <a:buNone/>
-            </a:pPr>
             <a:r>
               <a:rPr lang="en-US" sz="1250" dirty="0">
                 <a:solidFill>
@@ -9724,7 +9266,7 @@
           <a:bodyPr wrap="square" lIns="0" tIns="0" rIns="0" bIns="0" rtlCol="0" anchor="t"/>
           <a:lstStyle/>
           <a:p>
-            <a:pPr algn="l" marL="342900" indent="-342900">
+            <a:pPr marL="342900" indent="-342900" algn="l">
               <a:lnSpc>
                 <a:spcPts val="2000"/>
               </a:lnSpc>
@@ -9743,12 +9285,6 @@
               </a:rPr>
               <a:t>Delivery Phase: </a:t>
             </a:r>
-            <a:pPr algn="l" indent="0" marL="0">
-              <a:lnSpc>
-                <a:spcPts val="2000"/>
-              </a:lnSpc>
-              <a:buNone/>
-            </a:pPr>
             <a:r>
               <a:rPr lang="en-US" sz="1250" dirty="0">
                 <a:solidFill>
@@ -9810,7 +9346,7 @@
           <a:bodyPr wrap="none" lIns="0" tIns="0" rIns="0" bIns="0" rtlCol="0" anchor="t"/>
           <a:lstStyle/>
           <a:p>
-            <a:pPr algn="l" indent="0" marL="0">
+            <a:pPr marL="0" indent="0" algn="l">
               <a:lnSpc>
                 <a:spcPts val="5550"/>
               </a:lnSpc>
@@ -9852,7 +9388,7 @@
           <a:bodyPr wrap="square" lIns="0" tIns="0" rIns="0" bIns="0" rtlCol="0" anchor="t"/>
           <a:lstStyle/>
           <a:p>
-            <a:pPr algn="l" indent="0" marL="0">
+            <a:pPr marL="0" indent="0" algn="l">
               <a:lnSpc>
                 <a:spcPts val="2850"/>
               </a:lnSpc>
@@ -9900,14 +9436,14 @@
       </p:grpSpPr>
       <p:pic>
         <p:nvPicPr>
-          <p:cNvPr id="2" name="Image 0" descr="preencoded.png">    </p:cNvPr>
+          <p:cNvPr id="2" name="Image 0" descr="preencoded.png"/>
           <p:cNvPicPr>
             <a:picLocks noChangeAspect="1"/>
           </p:cNvPicPr>
           <p:nvPr/>
         </p:nvPicPr>
         <p:blipFill>
-          <a:blip r:embed="rId1"/>
+          <a:blip r:embed="rId3"/>
           <a:stretch>
             <a:fillRect/>
           </a:stretch>
@@ -9924,14 +9460,14 @@
       </p:pic>
       <p:pic>
         <p:nvPicPr>
-          <p:cNvPr id="3" name="Image 1" descr="preencoded.png">    </p:cNvPr>
+          <p:cNvPr id="3" name="Image 1" descr="preencoded.png"/>
           <p:cNvPicPr>
             <a:picLocks noChangeAspect="1"/>
           </p:cNvPicPr>
           <p:nvPr/>
         </p:nvPicPr>
         <p:blipFill>
-          <a:blip r:embed="rId2"/>
+          <a:blip r:embed="rId4"/>
           <a:stretch>
             <a:fillRect/>
           </a:stretch>
@@ -9967,7 +9503,7 @@
           <a:bodyPr wrap="none" lIns="0" tIns="0" rIns="0" bIns="0" rtlCol="0" anchor="t"/>
           <a:lstStyle/>
           <a:p>
-            <a:pPr algn="l" indent="0" marL="0">
+            <a:pPr marL="0" indent="0" algn="l">
               <a:lnSpc>
                 <a:spcPts val="5550"/>
               </a:lnSpc>
@@ -10009,7 +9545,7 @@
           <a:bodyPr wrap="square" lIns="0" tIns="0" rIns="0" bIns="0" rtlCol="0" anchor="t"/>
           <a:lstStyle/>
           <a:p>
-            <a:pPr algn="l" indent="0" marL="0">
+            <a:pPr marL="0" indent="0" algn="l">
               <a:lnSpc>
                 <a:spcPts val="2850"/>
               </a:lnSpc>
@@ -10057,14 +9593,14 @@
       </p:grpSpPr>
       <p:pic>
         <p:nvPicPr>
-          <p:cNvPr id="2" name="Image 0" descr="preencoded.png">    </p:cNvPr>
+          <p:cNvPr id="2" name="Image 0" descr="preencoded.png"/>
           <p:cNvPicPr>
             <a:picLocks noChangeAspect="1"/>
           </p:cNvPicPr>
           <p:nvPr/>
         </p:nvPicPr>
         <p:blipFill>
-          <a:blip r:embed="rId1"/>
+          <a:blip r:embed="rId3"/>
           <a:stretch>
             <a:fillRect/>
           </a:stretch>
@@ -10081,14 +9617,14 @@
       </p:pic>
       <p:pic>
         <p:nvPicPr>
-          <p:cNvPr id="3" name="Image 1" descr="preencoded.png">    </p:cNvPr>
+          <p:cNvPr id="3" name="Image 1" descr="preencoded.png"/>
           <p:cNvPicPr>
             <a:picLocks noChangeAspect="1"/>
           </p:cNvPicPr>
           <p:nvPr/>
         </p:nvPicPr>
         <p:blipFill>
-          <a:blip r:embed="rId2"/>
+          <a:blip r:embed="rId4"/>
           <a:stretch>
             <a:fillRect/>
           </a:stretch>
@@ -10124,7 +9660,7 @@
           <a:bodyPr wrap="square" lIns="0" tIns="0" rIns="0" bIns="0" rtlCol="0" anchor="t"/>
           <a:lstStyle/>
           <a:p>
-            <a:pPr algn="l" indent="0" marL="0">
+            <a:pPr marL="0" indent="0" algn="l">
               <a:lnSpc>
                 <a:spcPts val="5550"/>
               </a:lnSpc>
@@ -10166,7 +9702,7 @@
           <a:bodyPr wrap="square" lIns="0" tIns="0" rIns="0" bIns="0" rtlCol="0" anchor="t"/>
           <a:lstStyle/>
           <a:p>
-            <a:pPr algn="l" indent="0" marL="0">
+            <a:pPr marL="0" indent="0" algn="l">
               <a:lnSpc>
                 <a:spcPts val="2850"/>
               </a:lnSpc>
@@ -10208,7 +9744,7 @@
           <a:bodyPr wrap="none" lIns="0" tIns="0" rIns="0" bIns="0" rtlCol="0" anchor="t"/>
           <a:lstStyle/>
           <a:p>
-            <a:pPr algn="l" indent="0" marL="0">
+            <a:pPr marL="0" indent="0" algn="l">
               <a:lnSpc>
                 <a:spcPts val="2850"/>
               </a:lnSpc>
@@ -10250,13 +9786,13 @@
           <a:bodyPr wrap="none" lIns="0" tIns="0" rIns="0" bIns="0" rtlCol="0" anchor="t"/>
           <a:lstStyle/>
           <a:p>
-            <a:pPr algn="l" marL="342900" indent="-342900">
+            <a:pPr marL="342900" indent="-342900" algn="l">
               <a:lnSpc>
                 <a:spcPts val="2850"/>
               </a:lnSpc>
               <a:buSzPct val="100000"/>
               <a:buFont typeface="+mj-lt"/>
-              <a:buAutoNum type="arabicPeriod" startAt="1"/>
+              <a:buAutoNum type="arabicPeriod"/>
             </a:pPr>
             <a:r>
               <a:rPr lang="en-US" sz="1750" dirty="0">
@@ -10294,7 +9830,7 @@
           <a:bodyPr wrap="none" lIns="0" tIns="0" rIns="0" bIns="0" rtlCol="0" anchor="t"/>
           <a:lstStyle/>
           <a:p>
-            <a:pPr algn="l" marL="342900" indent="-342900">
+            <a:pPr marL="342900" indent="-342900" algn="l">
               <a:lnSpc>
                 <a:spcPts val="2850"/>
               </a:lnSpc>
@@ -10338,7 +9874,7 @@
           <a:bodyPr wrap="none" lIns="0" tIns="0" rIns="0" bIns="0" rtlCol="0" anchor="t"/>
           <a:lstStyle/>
           <a:p>
-            <a:pPr algn="l" marL="342900" indent="-342900">
+            <a:pPr marL="342900" indent="-342900" algn="l">
               <a:lnSpc>
                 <a:spcPts val="2850"/>
               </a:lnSpc>
@@ -10388,14 +9924,14 @@
       </p:grpSpPr>
       <p:pic>
         <p:nvPicPr>
-          <p:cNvPr id="2" name="Image 0" descr="preencoded.png">    </p:cNvPr>
+          <p:cNvPr id="2" name="Image 0" descr="preencoded.png"/>
           <p:cNvPicPr>
             <a:picLocks noChangeAspect="1"/>
           </p:cNvPicPr>
           <p:nvPr/>
         </p:nvPicPr>
         <p:blipFill>
-          <a:blip r:embed="rId1"/>
+          <a:blip r:embed="rId3"/>
           <a:stretch>
             <a:fillRect/>
           </a:stretch>
@@ -10412,14 +9948,14 @@
       </p:pic>
       <p:pic>
         <p:nvPicPr>
-          <p:cNvPr id="3" name="Image 1" descr="preencoded.png">    </p:cNvPr>
+          <p:cNvPr id="3" name="Image 1" descr="preencoded.png"/>
           <p:cNvPicPr>
             <a:picLocks noChangeAspect="1"/>
           </p:cNvPicPr>
           <p:nvPr/>
         </p:nvPicPr>
         <p:blipFill>
-          <a:blip r:embed="rId2"/>
+          <a:blip r:embed="rId4"/>
           <a:stretch>
             <a:fillRect/>
           </a:stretch>
@@ -10455,7 +9991,7 @@
           <a:bodyPr wrap="none" lIns="0" tIns="0" rIns="0" bIns="0" rtlCol="0" anchor="t"/>
           <a:lstStyle/>
           <a:p>
-            <a:pPr algn="l" indent="0" marL="0">
+            <a:pPr marL="0" indent="0" algn="l">
               <a:lnSpc>
                 <a:spcPts val="5550"/>
               </a:lnSpc>
@@ -10497,7 +10033,7 @@
           <a:bodyPr wrap="square" lIns="0" tIns="0" rIns="0" bIns="0" rtlCol="0" anchor="t"/>
           <a:lstStyle/>
           <a:p>
-            <a:pPr algn="l" indent="0" marL="0">
+            <a:pPr marL="0" indent="0" algn="l">
               <a:lnSpc>
                 <a:spcPts val="2850"/>
               </a:lnSpc>
@@ -10545,14 +10081,14 @@
       </p:grpSpPr>
       <p:pic>
         <p:nvPicPr>
-          <p:cNvPr id="2" name="Image 0" descr="preencoded.png">    </p:cNvPr>
+          <p:cNvPr id="2" name="Image 0" descr="preencoded.png"/>
           <p:cNvPicPr>
             <a:picLocks noChangeAspect="1"/>
           </p:cNvPicPr>
           <p:nvPr/>
         </p:nvPicPr>
         <p:blipFill>
-          <a:blip r:embed="rId1"/>
+          <a:blip r:embed="rId3"/>
           <a:stretch>
             <a:fillRect/>
           </a:stretch>
@@ -10569,14 +10105,14 @@
       </p:pic>
       <p:pic>
         <p:nvPicPr>
-          <p:cNvPr id="3" name="Image 1" descr="preencoded.png">    </p:cNvPr>
+          <p:cNvPr id="3" name="Image 1" descr="preencoded.png"/>
           <p:cNvPicPr>
             <a:picLocks noChangeAspect="1"/>
           </p:cNvPicPr>
           <p:nvPr/>
         </p:nvPicPr>
         <p:blipFill>
-          <a:blip r:embed="rId2"/>
+          <a:blip r:embed="rId4"/>
           <a:stretch>
             <a:fillRect/>
           </a:stretch>
@@ -10612,7 +10148,7 @@
           <a:bodyPr wrap="none" lIns="0" tIns="0" rIns="0" bIns="0" rtlCol="0" anchor="t"/>
           <a:lstStyle/>
           <a:p>
-            <a:pPr algn="l" indent="0" marL="0">
+            <a:pPr marL="0" indent="0" algn="l">
               <a:lnSpc>
                 <a:spcPts val="5550"/>
               </a:lnSpc>
@@ -10654,7 +10190,7 @@
           <a:bodyPr wrap="square" lIns="0" tIns="0" rIns="0" bIns="0" rtlCol="0" anchor="t"/>
           <a:lstStyle/>
           <a:p>
-            <a:pPr algn="l" indent="0" marL="0">
+            <a:pPr marL="0" indent="0" algn="l">
               <a:lnSpc>
                 <a:spcPts val="2850"/>
               </a:lnSpc>
@@ -10668,7 +10204,7 @@
                 <a:latin typeface="Inter" pitchFamily="34" charset="0"/>
                 <a:ea typeface="Inter" pitchFamily="34" charset="-122"/>
                 <a:cs typeface="Inter" pitchFamily="34" charset="-120"/>
-                <a:hlinkClick r:id="rId3" invalidUrl="" action="" tgtFrame="" tooltip="" history="1" highlightClick="0" endSnd="0">
+                <a:hlinkClick r:id="rId5">
                   <a:extLst>
                     <a:ext uri="{A12FA001-AC4F-418D-AE19-62706E023703}">
                       <ahyp:hlinkClr xmlns:ahyp="http://schemas.microsoft.com/office/drawing/2018/hyperlinkcolor" val="tx"/>
@@ -10678,12 +10214,6 @@
               </a:rPr>
               <a:t>Boehm’s Model</a:t>
             </a:r>
-            <a:pPr algn="l" indent="0" marL="0">
-              <a:lnSpc>
-                <a:spcPts val="2850"/>
-              </a:lnSpc>
-              <a:buNone/>
-            </a:pPr>
             <a:r>
               <a:rPr lang="en-US" sz="1750" dirty="0">
                 <a:solidFill>
@@ -10726,14 +10256,14 @@
       </p:grpSpPr>
       <p:pic>
         <p:nvPicPr>
-          <p:cNvPr id="2" name="Image 0" descr="preencoded.png">    </p:cNvPr>
+          <p:cNvPr id="2" name="Image 0" descr="preencoded.png"/>
           <p:cNvPicPr>
             <a:picLocks noChangeAspect="1"/>
           </p:cNvPicPr>
           <p:nvPr/>
         </p:nvPicPr>
         <p:blipFill>
-          <a:blip r:embed="rId1"/>
+          <a:blip r:embed="rId3"/>
           <a:stretch>
             <a:fillRect/>
           </a:stretch>
@@ -10750,14 +10280,14 @@
       </p:pic>
       <p:pic>
         <p:nvPicPr>
-          <p:cNvPr id="3" name="Image 1" descr="preencoded.png">    </p:cNvPr>
+          <p:cNvPr id="3" name="Image 1" descr="preencoded.png"/>
           <p:cNvPicPr>
             <a:picLocks noChangeAspect="1"/>
           </p:cNvPicPr>
           <p:nvPr/>
         </p:nvPicPr>
         <p:blipFill>
-          <a:blip r:embed="rId2"/>
+          <a:blip r:embed="rId4"/>
           <a:stretch>
             <a:fillRect/>
           </a:stretch>
@@ -10793,7 +10323,7 @@
           <a:bodyPr wrap="none" lIns="0" tIns="0" rIns="0" bIns="0" rtlCol="0" anchor="t"/>
           <a:lstStyle/>
           <a:p>
-            <a:pPr algn="l" indent="0" marL="0">
+            <a:pPr marL="0" indent="0" algn="l">
               <a:lnSpc>
                 <a:spcPts val="5550"/>
               </a:lnSpc>
@@ -10835,7 +10365,7 @@
           <a:bodyPr wrap="square" lIns="0" tIns="0" rIns="0" bIns="0" rtlCol="0" anchor="t"/>
           <a:lstStyle/>
           <a:p>
-            <a:pPr algn="l" indent="0" marL="0">
+            <a:pPr marL="0" indent="0" algn="l">
               <a:lnSpc>
                 <a:spcPts val="2850"/>
               </a:lnSpc>
@@ -10902,7 +10432,7 @@
           <a:bodyPr wrap="none" lIns="0" tIns="0" rIns="0" bIns="0" rtlCol="0" anchor="t"/>
           <a:lstStyle/>
           <a:p>
-            <a:pPr algn="l" indent="0" marL="0">
+            <a:pPr marL="0" indent="0" algn="l">
               <a:lnSpc>
                 <a:spcPts val="5550"/>
               </a:lnSpc>
@@ -10944,7 +10474,7 @@
           <a:bodyPr wrap="square" lIns="0" tIns="0" rIns="0" bIns="0" rtlCol="0" anchor="t"/>
           <a:lstStyle/>
           <a:p>
-            <a:pPr algn="l" indent="0" marL="0">
+            <a:pPr marL="0" indent="0" algn="l">
               <a:lnSpc>
                 <a:spcPts val="2850"/>
               </a:lnSpc>
@@ -10986,7 +10516,7 @@
           <a:bodyPr wrap="none" lIns="0" tIns="0" rIns="0" bIns="0" rtlCol="0" anchor="t"/>
           <a:lstStyle/>
           <a:p>
-            <a:pPr algn="l" indent="0" marL="0">
+            <a:pPr marL="0" indent="0" algn="l">
               <a:lnSpc>
                 <a:spcPts val="2850"/>
               </a:lnSpc>
@@ -11028,7 +10558,7 @@
           <a:bodyPr wrap="none" lIns="0" tIns="0" rIns="0" bIns="0" rtlCol="0" anchor="t"/>
           <a:lstStyle/>
           <a:p>
-            <a:pPr algn="l" marL="342900" indent="-342900">
+            <a:pPr marL="342900" indent="-342900" algn="l">
               <a:lnSpc>
                 <a:spcPts val="2850"/>
               </a:lnSpc>
@@ -11071,7 +10601,7 @@
           <a:bodyPr wrap="none" lIns="0" tIns="0" rIns="0" bIns="0" rtlCol="0" anchor="t"/>
           <a:lstStyle/>
           <a:p>
-            <a:pPr algn="l" marL="342900" indent="-342900">
+            <a:pPr marL="342900" indent="-342900" algn="l">
               <a:lnSpc>
                 <a:spcPts val="2850"/>
               </a:lnSpc>
@@ -11139,7 +10669,7 @@
           <a:bodyPr wrap="none" lIns="0" tIns="0" rIns="0" bIns="0" rtlCol="0" anchor="t"/>
           <a:lstStyle/>
           <a:p>
-            <a:pPr algn="l" indent="0" marL="0">
+            <a:pPr marL="0" indent="0" algn="l">
               <a:lnSpc>
                 <a:spcPts val="4450"/>
               </a:lnSpc>
@@ -11181,7 +10711,7 @@
           <a:bodyPr wrap="none" lIns="0" tIns="0" rIns="0" bIns="0" rtlCol="0" anchor="t"/>
           <a:lstStyle/>
           <a:p>
-            <a:pPr algn="l" marL="342900" indent="-342900">
+            <a:pPr marL="342900" indent="-342900" algn="l">
               <a:lnSpc>
                 <a:spcPts val="2850"/>
               </a:lnSpc>
@@ -11224,7 +10754,7 @@
           <a:bodyPr wrap="none" lIns="0" tIns="0" rIns="0" bIns="0" rtlCol="0" anchor="t"/>
           <a:lstStyle/>
           <a:p>
-            <a:pPr algn="l" lvl="1" marL="685800" indent="-342900">
+            <a:pPr marL="685800" lvl="1" indent="-342900" algn="l">
               <a:lnSpc>
                 <a:spcPts val="2850"/>
               </a:lnSpc>
@@ -11267,7 +10797,7 @@
           <a:bodyPr wrap="none" lIns="0" tIns="0" rIns="0" bIns="0" rtlCol="0" anchor="t"/>
           <a:lstStyle/>
           <a:p>
-            <a:pPr algn="l" lvl="2" marL="1028700" indent="-342900">
+            <a:pPr marL="1028700" lvl="2" indent="-342900" algn="l">
               <a:lnSpc>
                 <a:spcPts val="2850"/>
               </a:lnSpc>
@@ -11310,7 +10840,7 @@
           <a:bodyPr wrap="none" lIns="0" tIns="0" rIns="0" bIns="0" rtlCol="0" anchor="t"/>
           <a:lstStyle/>
           <a:p>
-            <a:pPr algn="l" lvl="1" marL="685800" indent="-342900">
+            <a:pPr marL="685800" lvl="1" indent="-342900" algn="l">
               <a:lnSpc>
                 <a:spcPts val="2850"/>
               </a:lnSpc>
@@ -11353,7 +10883,7 @@
           <a:bodyPr wrap="none" lIns="0" tIns="0" rIns="0" bIns="0" rtlCol="0" anchor="t"/>
           <a:lstStyle/>
           <a:p>
-            <a:pPr algn="l" lvl="2" marL="1028700" indent="-342900">
+            <a:pPr marL="1028700" lvl="2" indent="-342900" algn="l">
               <a:lnSpc>
                 <a:spcPts val="2850"/>
               </a:lnSpc>
@@ -11396,7 +10926,7 @@
           <a:bodyPr wrap="none" lIns="0" tIns="0" rIns="0" bIns="0" rtlCol="0" anchor="t"/>
           <a:lstStyle/>
           <a:p>
-            <a:pPr algn="l" marL="342900" indent="-342900">
+            <a:pPr marL="342900" indent="-342900" algn="l">
               <a:lnSpc>
                 <a:spcPts val="2850"/>
               </a:lnSpc>
@@ -11439,7 +10969,7 @@
           <a:bodyPr wrap="none" lIns="0" tIns="0" rIns="0" bIns="0" rtlCol="0" anchor="t"/>
           <a:lstStyle/>
           <a:p>
-            <a:pPr algn="l" marL="342900" indent="-342900">
+            <a:pPr marL="342900" indent="-342900" algn="l">
               <a:lnSpc>
                 <a:spcPts val="2850"/>
               </a:lnSpc>
@@ -11482,7 +11012,7 @@
           <a:bodyPr wrap="none" lIns="0" tIns="0" rIns="0" bIns="0" rtlCol="0" anchor="t"/>
           <a:lstStyle/>
           <a:p>
-            <a:pPr algn="l" lvl="1" marL="685800" indent="-342900">
+            <a:pPr marL="685800" lvl="1" indent="-342900" algn="l">
               <a:lnSpc>
                 <a:spcPts val="2850"/>
               </a:lnSpc>
@@ -11550,7 +11080,7 @@
           <a:bodyPr wrap="none" lIns="0" tIns="0" rIns="0" bIns="0" rtlCol="0" anchor="t"/>
           <a:lstStyle/>
           <a:p>
-            <a:pPr algn="l" indent="0" marL="0">
+            <a:pPr marL="0" indent="0" algn="l">
               <a:lnSpc>
                 <a:spcPts val="4450"/>
               </a:lnSpc>
@@ -11592,7 +11122,7 @@
           <a:bodyPr wrap="square" lIns="0" tIns="0" rIns="0" bIns="0" rtlCol="0" anchor="t"/>
           <a:lstStyle/>
           <a:p>
-            <a:pPr algn="l" indent="0" marL="0">
+            <a:pPr marL="0" indent="0" algn="l">
               <a:lnSpc>
                 <a:spcPts val="2850"/>
               </a:lnSpc>
@@ -11609,55 +11139,49 @@
               </a:rPr>
               <a:t>Framework</a:t>
             </a:r>
-            <a:pPr algn="l" indent="0" marL="0">
+            <a:r>
+              <a:rPr lang="en-US" sz="1750" dirty="0">
+                <a:solidFill>
+                  <a:srgbClr val="272525"/>
+                </a:solidFill>
+                <a:latin typeface="Inter" pitchFamily="34" charset="0"/>
+                <a:ea typeface="Inter" pitchFamily="34" charset="-122"/>
+                <a:cs typeface="Inter" pitchFamily="34" charset="-120"/>
+              </a:rPr>
+              <a:t> - a set of ideas, conditions, or assumptions that determine how something will be approached, perceived, or understood.</a:t>
+            </a:r>
+            <a:endParaRPr lang="en-US" sz="1750" dirty="0"/>
+          </a:p>
+        </p:txBody>
+      </p:sp>
+      <p:sp>
+        <p:nvSpPr>
+          <p:cNvPr id="4" name="Text 2"/>
+          <p:cNvSpPr/>
+          <p:nvPr/>
+        </p:nvSpPr>
+        <p:spPr>
+          <a:xfrm>
+            <a:off x="793790" y="4752618"/>
+            <a:ext cx="13042821" cy="725805"/>
+          </a:xfrm>
+          <a:prstGeom prst="rect">
+            <a:avLst/>
+          </a:prstGeom>
+          <a:noFill/>
+          <a:ln/>
+        </p:spPr>
+        <p:txBody>
+          <a:bodyPr wrap="square" lIns="0" tIns="0" rIns="0" bIns="0" rtlCol="0" anchor="t"/>
+          <a:lstStyle/>
+          <a:p>
+            <a:pPr marL="0" indent="0" algn="l">
               <a:lnSpc>
                 <a:spcPts val="2850"/>
               </a:lnSpc>
               <a:buNone/>
             </a:pPr>
             <a:r>
-              <a:rPr lang="en-US" sz="1750" dirty="0">
-                <a:solidFill>
-                  <a:srgbClr val="272525"/>
-                </a:solidFill>
-                <a:latin typeface="Inter" pitchFamily="34" charset="0"/>
-                <a:ea typeface="Inter" pitchFamily="34" charset="-122"/>
-                <a:cs typeface="Inter" pitchFamily="34" charset="-120"/>
-              </a:rPr>
-              <a:t> - a set of ideas, conditions, or assumptions that determine how something will be approached, perceived, or understood.</a:t>
-            </a:r>
-            <a:endParaRPr lang="en-US" sz="1750" dirty="0"/>
-          </a:p>
-        </p:txBody>
-      </p:sp>
-      <p:sp>
-        <p:nvSpPr>
-          <p:cNvPr id="4" name="Text 2"/>
-          <p:cNvSpPr/>
-          <p:nvPr/>
-        </p:nvSpPr>
-        <p:spPr>
-          <a:xfrm>
-            <a:off x="793790" y="4752618"/>
-            <a:ext cx="13042821" cy="725805"/>
-          </a:xfrm>
-          <a:prstGeom prst="rect">
-            <a:avLst/>
-          </a:prstGeom>
-          <a:noFill/>
-          <a:ln/>
-        </p:spPr>
-        <p:txBody>
-          <a:bodyPr wrap="square" lIns="0" tIns="0" rIns="0" bIns="0" rtlCol="0" anchor="t"/>
-          <a:lstStyle/>
-          <a:p>
-            <a:pPr algn="l" indent="0" marL="0">
-              <a:lnSpc>
-                <a:spcPts val="2850"/>
-              </a:lnSpc>
-              <a:buNone/>
-            </a:pPr>
-            <a:r>
               <a:rPr lang="en-US" sz="1750" b="1" dirty="0">
                 <a:solidFill>
                   <a:srgbClr val="272525"/>
@@ -11668,12 +11192,6 @@
               </a:rPr>
               <a:t>Safety-critical</a:t>
             </a:r>
-            <a:pPr algn="l" indent="0" marL="0">
-              <a:lnSpc>
-                <a:spcPts val="2850"/>
-              </a:lnSpc>
-              <a:buNone/>
-            </a:pPr>
             <a:r>
               <a:rPr lang="en-US" sz="1750" dirty="0">
                 <a:solidFill>
@@ -11735,7 +11253,7 @@
           <a:bodyPr wrap="none" lIns="0" tIns="0" rIns="0" bIns="0" rtlCol="0" anchor="t"/>
           <a:lstStyle/>
           <a:p>
-            <a:pPr algn="l" indent="0" marL="0">
+            <a:pPr marL="0" indent="0" algn="l">
               <a:lnSpc>
                 <a:spcPts val="4450"/>
               </a:lnSpc>
@@ -11777,7 +11295,7 @@
           <a:bodyPr wrap="square" lIns="0" tIns="0" rIns="0" bIns="0" rtlCol="0" anchor="t"/>
           <a:lstStyle/>
           <a:p>
-            <a:pPr algn="l" indent="0" marL="0">
+            <a:pPr marL="0" indent="0" algn="l">
               <a:lnSpc>
                 <a:spcPts val="2850"/>
               </a:lnSpc>
@@ -11794,29 +11312,30 @@
               </a:rPr>
               <a:t>Def: The </a:t>
             </a:r>
-            <a:pPr algn="l" indent="0" marL="0">
-              <a:lnSpc>
-                <a:spcPts val="2850"/>
-              </a:lnSpc>
-              <a:buNone/>
-            </a:pPr>
             <a:r>
               <a:rPr lang="en-US" sz="1750" dirty="0">
                 <a:solidFill>
+                  <a:schemeClr val="accent5">
+                    <a:lumMod val="75000"/>
+                  </a:schemeClr>
+                </a:solidFill>
+                <a:latin typeface="Inter" pitchFamily="34" charset="0"/>
+                <a:ea typeface="Inter" pitchFamily="34" charset="-122"/>
+                <a:cs typeface="Inter" pitchFamily="34" charset="-120"/>
+              </a:rPr>
+              <a:t>context</a:t>
+            </a:r>
+            <a:r>
+              <a:rPr lang="en-US" sz="1750" dirty="0">
+                <a:solidFill>
                   <a:srgbClr val="F9D933"/>
                 </a:solidFill>
                 <a:latin typeface="Inter" pitchFamily="34" charset="0"/>
                 <a:ea typeface="Inter" pitchFamily="34" charset="-122"/>
                 <a:cs typeface="Inter" pitchFamily="34" charset="-120"/>
               </a:rPr>
-              <a:t>context </a:t>
-            </a:r>
-            <a:pPr algn="l" indent="0" marL="0">
-              <a:lnSpc>
-                <a:spcPts val="2850"/>
-              </a:lnSpc>
-              <a:buNone/>
-            </a:pPr>
+              <a:t> </a:t>
+            </a:r>
             <a:r>
               <a:rPr lang="en-US" sz="1750" dirty="0">
                 <a:solidFill>
@@ -11828,16 +11347,12 @@
               </a:rPr>
               <a:t>and </a:t>
             </a:r>
-            <a:pPr algn="l" indent="0" marL="0">
-              <a:lnSpc>
-                <a:spcPts val="2850"/>
-              </a:lnSpc>
-              <a:buNone/>
-            </a:pPr>
             <a:r>
               <a:rPr lang="en-US" sz="1750" dirty="0">
                 <a:solidFill>
-                  <a:srgbClr val="F9D933"/>
+                  <a:schemeClr val="accent5">
+                    <a:lumMod val="75000"/>
+                  </a:schemeClr>
                 </a:solidFill>
                 <a:latin typeface="Inter" pitchFamily="34" charset="0"/>
                 <a:ea typeface="Inter" pitchFamily="34" charset="-122"/>
@@ -11845,12 +11360,6 @@
               </a:rPr>
               <a:t>environment</a:t>
             </a:r>
-            <a:pPr algn="l" indent="0" marL="0">
-              <a:lnSpc>
-                <a:spcPts val="2850"/>
-              </a:lnSpc>
-              <a:buNone/>
-            </a:pPr>
             <a:r>
               <a:rPr lang="en-US" sz="1750" dirty="0">
                 <a:solidFill>
@@ -11887,7 +11396,7 @@
           <a:bodyPr wrap="none" lIns="0" tIns="0" rIns="0" bIns="0" rtlCol="0" anchor="t"/>
           <a:lstStyle/>
           <a:p>
-            <a:pPr algn="l" indent="0" marL="0">
+            <a:pPr marL="0" indent="0" algn="l">
               <a:lnSpc>
                 <a:spcPts val="3300"/>
               </a:lnSpc>
@@ -11929,7 +11438,7 @@
           <a:bodyPr wrap="none" lIns="0" tIns="0" rIns="0" bIns="0" rtlCol="0" anchor="t"/>
           <a:lstStyle/>
           <a:p>
-            <a:pPr algn="l" marL="342900" indent="-342900">
+            <a:pPr marL="342900" indent="-342900" algn="l">
               <a:lnSpc>
                 <a:spcPts val="2850"/>
               </a:lnSpc>
@@ -11972,7 +11481,7 @@
           <a:bodyPr wrap="none" lIns="0" tIns="0" rIns="0" bIns="0" rtlCol="0" anchor="t"/>
           <a:lstStyle/>
           <a:p>
-            <a:pPr algn="l" marL="342900" indent="-342900">
+            <a:pPr marL="342900" indent="-342900" algn="l">
               <a:lnSpc>
                 <a:spcPts val="2850"/>
               </a:lnSpc>
@@ -12015,7 +11524,7 @@
           <a:bodyPr wrap="none" lIns="0" tIns="0" rIns="0" bIns="0" rtlCol="0" anchor="t"/>
           <a:lstStyle/>
           <a:p>
-            <a:pPr algn="l" marL="342900" indent="-342900">
+            <a:pPr marL="342900" indent="-342900" algn="l">
               <a:lnSpc>
                 <a:spcPts val="2850"/>
               </a:lnSpc>
@@ -12058,7 +11567,7 @@
           <a:bodyPr wrap="none" lIns="0" tIns="0" rIns="0" bIns="0" rtlCol="0" anchor="t"/>
           <a:lstStyle/>
           <a:p>
-            <a:pPr algn="l" marL="342900" indent="-342900">
+            <a:pPr marL="342900" indent="-342900" algn="l">
               <a:lnSpc>
                 <a:spcPts val="2850"/>
               </a:lnSpc>
@@ -12101,7 +11610,7 @@
           <a:bodyPr wrap="none" lIns="0" tIns="0" rIns="0" bIns="0" rtlCol="0" anchor="t"/>
           <a:lstStyle/>
           <a:p>
-            <a:pPr algn="l" marL="342900" indent="-342900">
+            <a:pPr marL="342900" indent="-342900" algn="l">
               <a:lnSpc>
                 <a:spcPts val="2850"/>
               </a:lnSpc>
@@ -12144,7 +11653,7 @@
           <a:bodyPr wrap="none" lIns="0" tIns="0" rIns="0" bIns="0" rtlCol="0" anchor="t"/>
           <a:lstStyle/>
           <a:p>
-            <a:pPr algn="l" marL="342900" indent="-342900">
+            <a:pPr marL="342900" indent="-342900" algn="l">
               <a:lnSpc>
                 <a:spcPts val="2850"/>
               </a:lnSpc>
@@ -12212,7 +11721,7 @@
           <a:bodyPr wrap="none" lIns="0" tIns="0" rIns="0" bIns="0" rtlCol="0" anchor="t"/>
           <a:lstStyle/>
           <a:p>
-            <a:pPr algn="l" indent="0" marL="0">
+            <a:pPr marL="0" indent="0" algn="l">
               <a:lnSpc>
                 <a:spcPts val="4450"/>
               </a:lnSpc>
@@ -12254,13 +11763,13 @@
           <a:bodyPr wrap="square" lIns="0" tIns="0" rIns="0" bIns="0" rtlCol="0" anchor="t"/>
           <a:lstStyle/>
           <a:p>
-            <a:pPr algn="l" marL="342900" indent="-342900">
+            <a:pPr marL="342900" indent="-342900" algn="l">
               <a:lnSpc>
                 <a:spcPts val="2850"/>
               </a:lnSpc>
               <a:buSzPct val="100000"/>
               <a:buFont typeface="+mj-lt"/>
-              <a:buAutoNum type="arabicPeriod" startAt="1"/>
+              <a:buAutoNum type="arabicPeriod"/>
             </a:pPr>
             <a:r>
               <a:rPr lang="en-US" sz="1750" b="1" dirty="0">
@@ -12273,12 +11782,6 @@
               </a:rPr>
               <a:t>User requirements: </a:t>
             </a:r>
-            <a:pPr algn="l" indent="0" marL="0">
-              <a:lnSpc>
-                <a:spcPts val="2850"/>
-              </a:lnSpc>
-              <a:buNone/>
-            </a:pPr>
             <a:r>
               <a:rPr lang="en-US" sz="1750" dirty="0">
                 <a:solidFill>
@@ -12315,13 +11818,13 @@
           <a:bodyPr wrap="none" lIns="0" tIns="0" rIns="0" bIns="0" rtlCol="0" anchor="t"/>
           <a:lstStyle/>
           <a:p>
-            <a:pPr algn="l" lvl="1" marL="685800" indent="-342900">
+            <a:pPr marL="685800" lvl="1" indent="-342900" algn="l">
               <a:lnSpc>
                 <a:spcPts val="2850"/>
               </a:lnSpc>
               <a:buSzPct val="100000"/>
               <a:buFont typeface="+mj-lt"/>
-              <a:buAutoNum type="arabicPeriod" startAt="1"/>
+              <a:buAutoNum type="arabicPeriod"/>
             </a:pPr>
             <a:r>
               <a:rPr lang="en-US" sz="1750" dirty="0">
@@ -12359,7 +11862,7 @@
           <a:bodyPr wrap="square" lIns="0" tIns="0" rIns="0" bIns="0" rtlCol="0" anchor="t"/>
           <a:lstStyle/>
           <a:p>
-            <a:pPr algn="l" lvl="1" marL="685800" indent="-342900">
+            <a:pPr marL="685800" lvl="1" indent="-342900" algn="l">
               <a:lnSpc>
                 <a:spcPts val="2850"/>
               </a:lnSpc>
@@ -12428,7 +11931,7 @@
           <a:bodyPr wrap="none" lIns="0" tIns="0" rIns="0" bIns="0" rtlCol="0" anchor="t"/>
           <a:lstStyle/>
           <a:p>
-            <a:pPr algn="l" indent="0" marL="0">
+            <a:pPr marL="0" indent="0" algn="l">
               <a:lnSpc>
                 <a:spcPts val="4450"/>
               </a:lnSpc>
@@ -12470,7 +11973,7 @@
           <a:bodyPr wrap="none" lIns="0" tIns="0" rIns="0" bIns="0" rtlCol="0" anchor="t"/>
           <a:lstStyle/>
           <a:p>
-            <a:pPr algn="l" indent="0" marL="0">
+            <a:pPr marL="0" indent="0" algn="l">
               <a:lnSpc>
                 <a:spcPts val="2850"/>
               </a:lnSpc>
@@ -12487,12 +11990,6 @@
               </a:rPr>
               <a:t>2.  Environment: </a:t>
             </a:r>
-            <a:pPr algn="l" indent="0" marL="0">
-              <a:lnSpc>
-                <a:spcPts val="2850"/>
-              </a:lnSpc>
-              <a:buNone/>
-            </a:pPr>
             <a:r>
               <a:rPr lang="en-US" sz="1750" dirty="0">
                 <a:solidFill>
@@ -12529,7 +12026,7 @@
           <a:bodyPr wrap="none" lIns="0" tIns="0" rIns="0" bIns="0" rtlCol="0" anchor="t"/>
           <a:lstStyle/>
           <a:p>
-            <a:pPr algn="l" indent="0" marL="0">
+            <a:pPr marL="0" indent="0" algn="l">
               <a:lnSpc>
                 <a:spcPts val="3300"/>
               </a:lnSpc>
@@ -12571,7 +12068,7 @@
           <a:bodyPr wrap="none" lIns="0" tIns="0" rIns="0" bIns="0" rtlCol="0" anchor="t"/>
           <a:lstStyle/>
           <a:p>
-            <a:pPr algn="l" marL="342900" indent="-342900">
+            <a:pPr marL="342900" indent="-342900" algn="l">
               <a:lnSpc>
                 <a:spcPts val="2850"/>
               </a:lnSpc>
@@ -12614,7 +12111,7 @@
           <a:bodyPr wrap="none" lIns="0" tIns="0" rIns="0" bIns="0" rtlCol="0" anchor="t"/>
           <a:lstStyle/>
           <a:p>
-            <a:pPr algn="l" marL="342900" indent="-342900">
+            <a:pPr marL="342900" indent="-342900" algn="l">
               <a:lnSpc>
                 <a:spcPts val="2850"/>
               </a:lnSpc>
@@ -12657,7 +12154,7 @@
           <a:bodyPr wrap="none" lIns="0" tIns="0" rIns="0" bIns="0" rtlCol="0" anchor="t"/>
           <a:lstStyle/>
           <a:p>
-            <a:pPr algn="l" indent="0" marL="0">
+            <a:pPr marL="0" indent="0" algn="l">
               <a:lnSpc>
                 <a:spcPts val="3300"/>
               </a:lnSpc>
@@ -12699,7 +12196,7 @@
           <a:bodyPr wrap="square" lIns="0" tIns="0" rIns="0" bIns="0" rtlCol="0" anchor="t"/>
           <a:lstStyle/>
           <a:p>
-            <a:pPr algn="l" indent="0" marL="0">
+            <a:pPr marL="0" indent="0" algn="l">
               <a:lnSpc>
                 <a:spcPts val="2850"/>
               </a:lnSpc>
@@ -12766,7 +12263,7 @@
           <a:bodyPr wrap="none" lIns="0" tIns="0" rIns="0" bIns="0" rtlCol="0" anchor="t"/>
           <a:lstStyle/>
           <a:p>
-            <a:pPr algn="l" indent="0" marL="0">
+            <a:pPr marL="0" indent="0" algn="l">
               <a:lnSpc>
                 <a:spcPts val="4450"/>
               </a:lnSpc>
@@ -12808,7 +12305,7 @@
           <a:bodyPr wrap="square" lIns="0" tIns="0" rIns="0" bIns="0" rtlCol="0" anchor="t"/>
           <a:lstStyle/>
           <a:p>
-            <a:pPr algn="l" indent="0" marL="0">
+            <a:pPr marL="0" indent="0" algn="l">
               <a:lnSpc>
                 <a:spcPts val="2850"/>
               </a:lnSpc>
@@ -12850,7 +12347,7 @@
           <a:bodyPr wrap="square" lIns="0" tIns="0" rIns="0" bIns="0" rtlCol="0" anchor="t"/>
           <a:lstStyle/>
           <a:p>
-            <a:pPr algn="l" indent="0" marL="0">
+            <a:pPr marL="0" indent="0" algn="l">
               <a:lnSpc>
                 <a:spcPts val="2850"/>
               </a:lnSpc>
@@ -12867,12 +12364,6 @@
               </a:rPr>
               <a:t>Real world Case:</a:t>
             </a:r>
-            <a:pPr algn="l" indent="0" marL="0">
-              <a:lnSpc>
-                <a:spcPts val="2850"/>
-              </a:lnSpc>
-              <a:buNone/>
-            </a:pPr>
             <a:r>
               <a:rPr lang="en-US" sz="1750" b="1" dirty="0">
                 <a:solidFill>
@@ -12884,12 +12375,6 @@
               </a:rPr>
               <a:t> Solaris 1.x was upgraded to Solaris 2.x . </a:t>
             </a:r>
-            <a:pPr algn="l" indent="0" marL="0">
-              <a:lnSpc>
-                <a:spcPts val="2850"/>
-              </a:lnSpc>
-              <a:buNone/>
-            </a:pPr>
             <a:r>
               <a:rPr lang="en-US" sz="1750" dirty="0">
                 <a:solidFill>
@@ -12951,7 +12436,7 @@
           <a:bodyPr wrap="none" lIns="0" tIns="0" rIns="0" bIns="0" rtlCol="0" anchor="t"/>
           <a:lstStyle/>
           <a:p>
-            <a:pPr algn="l" indent="0" marL="0">
+            <a:pPr marL="0" indent="0" algn="l">
               <a:lnSpc>
                 <a:spcPts val="4450"/>
               </a:lnSpc>
@@ -12993,7 +12478,7 @@
           <a:bodyPr wrap="square" lIns="0" tIns="0" rIns="0" bIns="0" rtlCol="0" anchor="t"/>
           <a:lstStyle/>
           <a:p>
-            <a:pPr algn="l" indent="0" marL="0">
+            <a:pPr marL="0" indent="0" algn="l">
               <a:lnSpc>
                 <a:spcPts val="2850"/>
               </a:lnSpc>
@@ -13010,7 +12495,43 @@
               </a:rPr>
               <a:t>b) Organizational Environment: </a:t>
             </a:r>
-            <a:pPr algn="l" indent="0" marL="0">
+            <a:r>
+              <a:rPr lang="en-US" sz="1750" dirty="0">
+                <a:solidFill>
+                  <a:srgbClr val="272525"/>
+                </a:solidFill>
+                <a:latin typeface="Inter" pitchFamily="34" charset="0"/>
+                <a:ea typeface="Inter" pitchFamily="34" charset="-122"/>
+                <a:cs typeface="Inter" pitchFamily="34" charset="-120"/>
+              </a:rPr>
+              <a:t>Entities of the organizational environment are policies and imposed factors of business and taxation, and also competition in the marketplace.</a:t>
+            </a:r>
+            <a:endParaRPr lang="en-US" sz="1750" dirty="0"/>
+          </a:p>
+        </p:txBody>
+      </p:sp>
+      <p:sp>
+        <p:nvSpPr>
+          <p:cNvPr id="4" name="Text 2"/>
+          <p:cNvSpPr/>
+          <p:nvPr/>
+        </p:nvSpPr>
+        <p:spPr>
+          <a:xfrm>
+            <a:off x="793790" y="4262199"/>
+            <a:ext cx="13042821" cy="725805"/>
+          </a:xfrm>
+          <a:prstGeom prst="rect">
+            <a:avLst/>
+          </a:prstGeom>
+          <a:noFill/>
+          <a:ln/>
+        </p:spPr>
+        <p:txBody>
+          <a:bodyPr wrap="square" lIns="0" tIns="0" rIns="0" bIns="0" rtlCol="0" anchor="t"/>
+          <a:lstStyle/>
+          <a:p>
+            <a:pPr marL="0" indent="0" algn="l">
               <a:lnSpc>
                 <a:spcPts val="2850"/>
               </a:lnSpc>
@@ -13025,7 +12546,29 @@
                 <a:ea typeface="Inter" pitchFamily="34" charset="-122"/>
                 <a:cs typeface="Inter" pitchFamily="34" charset="-120"/>
               </a:rPr>
-              <a:t>Entities of the organizational environment are policies and imposed factors of business and taxation, and also competition in the marketplace.</a:t>
+              <a:t> i) </a:t>
+            </a:r>
+            <a:r>
+              <a:rPr lang="en-US" sz="1750" b="1" dirty="0">
+                <a:solidFill>
+                  <a:srgbClr val="272525"/>
+                </a:solidFill>
+                <a:latin typeface="Inter" pitchFamily="34" charset="0"/>
+                <a:ea typeface="Inter" pitchFamily="34" charset="-122"/>
+                <a:cs typeface="Inter" pitchFamily="34" charset="-120"/>
+              </a:rPr>
+              <a:t>Change in policies</a:t>
+            </a:r>
+            <a:r>
+              <a:rPr lang="en-US" sz="1750" dirty="0">
+                <a:solidFill>
+                  <a:srgbClr val="272525"/>
+                </a:solidFill>
+                <a:latin typeface="Inter" pitchFamily="34" charset="0"/>
+                <a:ea typeface="Inter" pitchFamily="34" charset="-122"/>
+                <a:cs typeface="Inter" pitchFamily="34" charset="-120"/>
+              </a:rPr>
+              <a:t>: Any change in business rules and taxation policies which are incorporated into programs leads to theirs corresponding modification. Example : Value Added Tax (VAT)</a:t>
             </a:r>
             <a:endParaRPr lang="en-US" sz="1750" dirty="0"/>
           </a:p>
@@ -13033,13 +12576,13 @@
       </p:sp>
       <p:sp>
         <p:nvSpPr>
-          <p:cNvPr id="4" name="Text 2"/>
-          <p:cNvSpPr/>
-          <p:nvPr/>
-        </p:nvSpPr>
-        <p:spPr>
-          <a:xfrm>
-            <a:off x="793790" y="4262199"/>
+          <p:cNvPr id="5" name="Text 3"/>
+          <p:cNvSpPr/>
+          <p:nvPr/>
+        </p:nvSpPr>
+        <p:spPr>
+          <a:xfrm>
+            <a:off x="793790" y="5243155"/>
             <a:ext cx="13042821" cy="725805"/>
           </a:xfrm>
           <a:prstGeom prst="rect">
@@ -13052,7 +12595,7 @@
           <a:bodyPr wrap="square" lIns="0" tIns="0" rIns="0" bIns="0" rtlCol="0" anchor="t"/>
           <a:lstStyle/>
           <a:p>
-            <a:pPr algn="l" indent="0" marL="0">
+            <a:pPr marL="0" indent="0" algn="l">
               <a:lnSpc>
                 <a:spcPts val="2850"/>
               </a:lnSpc>
@@ -13067,14 +12610,8 @@
                 <a:ea typeface="Inter" pitchFamily="34" charset="-122"/>
                 <a:cs typeface="Inter" pitchFamily="34" charset="-120"/>
               </a:rPr>
-              <a:t> i) </a:t>
-            </a:r>
-            <a:pPr algn="l" indent="0" marL="0">
-              <a:lnSpc>
-                <a:spcPts val="2850"/>
-              </a:lnSpc>
-              <a:buNone/>
-            </a:pPr>
+              <a:t> ii) </a:t>
+            </a:r>
             <a:r>
               <a:rPr lang="en-US" sz="1750" b="1" dirty="0">
                 <a:solidFill>
@@ -13084,90 +12621,8 @@
                 <a:ea typeface="Inter" pitchFamily="34" charset="-122"/>
                 <a:cs typeface="Inter" pitchFamily="34" charset="-120"/>
               </a:rPr>
-              <a:t>Change in policies</a:t>
-            </a:r>
-            <a:pPr algn="l" indent="0" marL="0">
-              <a:lnSpc>
-                <a:spcPts val="2850"/>
-              </a:lnSpc>
-              <a:buNone/>
-            </a:pPr>
-            <a:r>
-              <a:rPr lang="en-US" sz="1750" dirty="0">
-                <a:solidFill>
-                  <a:srgbClr val="272525"/>
-                </a:solidFill>
-                <a:latin typeface="Inter" pitchFamily="34" charset="0"/>
-                <a:ea typeface="Inter" pitchFamily="34" charset="-122"/>
-                <a:cs typeface="Inter" pitchFamily="34" charset="-120"/>
-              </a:rPr>
-              <a:t>: Any change in business rules and taxation policies which are incorporated into programs leads to theirs corresponding modification. Example : Value Added Tax (VAT)</a:t>
-            </a:r>
-            <a:endParaRPr lang="en-US" sz="1750" dirty="0"/>
-          </a:p>
-        </p:txBody>
-      </p:sp>
-      <p:sp>
-        <p:nvSpPr>
-          <p:cNvPr id="5" name="Text 3"/>
-          <p:cNvSpPr/>
-          <p:nvPr/>
-        </p:nvSpPr>
-        <p:spPr>
-          <a:xfrm>
-            <a:off x="793790" y="5243155"/>
-            <a:ext cx="13042821" cy="725805"/>
-          </a:xfrm>
-          <a:prstGeom prst="rect">
-            <a:avLst/>
-          </a:prstGeom>
-          <a:noFill/>
-          <a:ln/>
-        </p:spPr>
-        <p:txBody>
-          <a:bodyPr wrap="square" lIns="0" tIns="0" rIns="0" bIns="0" rtlCol="0" anchor="t"/>
-          <a:lstStyle/>
-          <a:p>
-            <a:pPr algn="l" indent="0" marL="0">
-              <a:lnSpc>
-                <a:spcPts val="2850"/>
-              </a:lnSpc>
-              <a:buNone/>
-            </a:pPr>
-            <a:r>
-              <a:rPr lang="en-US" sz="1750" dirty="0">
-                <a:solidFill>
-                  <a:srgbClr val="272525"/>
-                </a:solidFill>
-                <a:latin typeface="Inter" pitchFamily="34" charset="0"/>
-                <a:ea typeface="Inter" pitchFamily="34" charset="-122"/>
-                <a:cs typeface="Inter" pitchFamily="34" charset="-120"/>
-              </a:rPr>
-              <a:t> ii) </a:t>
-            </a:r>
-            <a:pPr algn="l" indent="0" marL="0">
-              <a:lnSpc>
-                <a:spcPts val="2850"/>
-              </a:lnSpc>
-              <a:buNone/>
-            </a:pPr>
-            <a:r>
-              <a:rPr lang="en-US" sz="1750" b="1" dirty="0">
-                <a:solidFill>
-                  <a:srgbClr val="272525"/>
-                </a:solidFill>
-                <a:latin typeface="Inter" pitchFamily="34" charset="0"/>
-                <a:ea typeface="Inter" pitchFamily="34" charset="-122"/>
-                <a:cs typeface="Inter" pitchFamily="34" charset="-120"/>
-              </a:rPr>
               <a:t>Competition in the marketplace:</a:t>
             </a:r>
-            <a:pPr algn="l" indent="0" marL="0">
-              <a:lnSpc>
-                <a:spcPts val="2850"/>
-              </a:lnSpc>
-              <a:buNone/>
-            </a:pPr>
             <a:r>
               <a:rPr lang="en-US" sz="1750" dirty="0">
                 <a:solidFill>
@@ -13484,4 +12939,299 @@
     </a:ext>
   </a:extLst>
 </a:theme>
+</file>
+
+<file path=ppt/theme/theme2.xml><?xml version="1.0" encoding="utf-8"?>
+<a:theme xmlns:a="http://schemas.openxmlformats.org/drawingml/2006/main" name="Office Theme">
+  <a:themeElements>
+    <a:clrScheme name="Office">
+      <a:dk1>
+        <a:sysClr val="windowText" lastClr="000000"/>
+      </a:dk1>
+      <a:lt1>
+        <a:sysClr val="window" lastClr="FFFFFF"/>
+      </a:lt1>
+      <a:dk2>
+        <a:srgbClr val="44546A"/>
+      </a:dk2>
+      <a:lt2>
+        <a:srgbClr val="E7E6E6"/>
+      </a:lt2>
+      <a:accent1>
+        <a:srgbClr val="4472C4"/>
+      </a:accent1>
+      <a:accent2>
+        <a:srgbClr val="ED7D31"/>
+      </a:accent2>
+      <a:accent3>
+        <a:srgbClr val="A5A5A5"/>
+      </a:accent3>
+      <a:accent4>
+        <a:srgbClr val="FFC000"/>
+      </a:accent4>
+      <a:accent5>
+        <a:srgbClr val="5B9BD5"/>
+      </a:accent5>
+      <a:accent6>
+        <a:srgbClr val="70AD47"/>
+      </a:accent6>
+      <a:hlink>
+        <a:srgbClr val="0563C1"/>
+      </a:hlink>
+      <a:folHlink>
+        <a:srgbClr val="954F72"/>
+      </a:folHlink>
+    </a:clrScheme>
+    <a:fontScheme name="Office">
+      <a:majorFont>
+        <a:latin typeface="Calibri Light" panose="020F0302020204030204"/>
+        <a:ea typeface=""/>
+        <a:cs typeface=""/>
+        <a:font script="Jpan" typeface="游ゴシック Light"/>
+        <a:font script="Hang" typeface="맑은 고딕"/>
+        <a:font script="Hans" typeface="等线 Light"/>
+        <a:font script="Hant" typeface="新細明體"/>
+        <a:font script="Arab" typeface="Times New Roman"/>
+        <a:font script="Hebr" typeface="Times New Roman"/>
+        <a:font script="Thai" typeface="Angsana New"/>
+        <a:font script="Ethi" typeface="Nyala"/>
+        <a:font script="Beng" typeface="Vrinda"/>
+        <a:font script="Gujr" typeface="Shruti"/>
+        <a:font script="Khmr" typeface="MoolBoran"/>
+        <a:font script="Knda" typeface="Tunga"/>
+        <a:font script="Guru" typeface="Raavi"/>
+        <a:font script="Cans" typeface="Euphemia"/>
+        <a:font script="Cher" typeface="Plantagenet Cherokee"/>
+        <a:font script="Yiii" typeface="Microsoft Yi Baiti"/>
+        <a:font script="Tibt" typeface="Microsoft Himalaya"/>
+        <a:font script="Thaa" typeface="MV Boli"/>
+        <a:font script="Deva" typeface="Mangal"/>
+        <a:font script="Telu" typeface="Gautami"/>
+        <a:font script="Taml" typeface="Latha"/>
+        <a:font script="Syrc" typeface="Estrangelo Edessa"/>
+        <a:font script="Orya" typeface="Kalinga"/>
+        <a:font script="Mlym" typeface="Kartika"/>
+        <a:font script="Laoo" typeface="DokChampa"/>
+        <a:font script="Sinh" typeface="Iskoola Pota"/>
+        <a:font script="Mong" typeface="Mongolian Baiti"/>
+        <a:font script="Viet" typeface="Times New Roman"/>
+        <a:font script="Uigh" typeface="Microsoft Uighur"/>
+        <a:font script="Geor" typeface="Sylfaen"/>
+        <a:font script="Armn" typeface="Arial"/>
+        <a:font script="Bugi" typeface="Leelawadee UI"/>
+        <a:font script="Bopo" typeface="Microsoft JhengHei"/>
+        <a:font script="Java" typeface="Javanese Text"/>
+        <a:font script="Lisu" typeface="Segoe UI"/>
+        <a:font script="Mymr" typeface="Myanmar Text"/>
+        <a:font script="Nkoo" typeface="Ebrima"/>
+        <a:font script="Olck" typeface="Nirmala UI"/>
+        <a:font script="Osma" typeface="Ebrima"/>
+        <a:font script="Phag" typeface="Phagspa"/>
+        <a:font script="Syrn" typeface="Estrangelo Edessa"/>
+        <a:font script="Syrj" typeface="Estrangelo Edessa"/>
+        <a:font script="Syre" typeface="Estrangelo Edessa"/>
+        <a:font script="Sora" typeface="Nirmala UI"/>
+        <a:font script="Tale" typeface="Microsoft Tai Le"/>
+        <a:font script="Talu" typeface="Microsoft New Tai Lue"/>
+        <a:font script="Tfng" typeface="Ebrima"/>
+      </a:majorFont>
+      <a:minorFont>
+        <a:latin typeface="Calibri" panose="020F0502020204030204"/>
+        <a:ea typeface=""/>
+        <a:cs typeface=""/>
+        <a:font script="Jpan" typeface="游ゴシック"/>
+        <a:font script="Hang" typeface="맑은 고딕"/>
+        <a:font script="Hans" typeface="等线"/>
+        <a:font script="Hant" typeface="新細明體"/>
+        <a:font script="Arab" typeface="Arial"/>
+        <a:font script="Hebr" typeface="Arial"/>
+        <a:font script="Thai" typeface="Cordia New"/>
+        <a:font script="Ethi" typeface="Nyala"/>
+        <a:font script="Beng" typeface="Vrinda"/>
+        <a:font script="Gujr" typeface="Shruti"/>
+        <a:font script="Khmr" typeface="DaunPenh"/>
+        <a:font script="Knda" typeface="Tunga"/>
+        <a:font script="Guru" typeface="Raavi"/>
+        <a:font script="Cans" typeface="Euphemia"/>
+        <a:font script="Cher" typeface="Plantagenet Cherokee"/>
+        <a:font script="Yiii" typeface="Microsoft Yi Baiti"/>
+        <a:font script="Tibt" typeface="Microsoft Himalaya"/>
+        <a:font script="Thaa" typeface="MV Boli"/>
+        <a:font script="Deva" typeface="Mangal"/>
+        <a:font script="Telu" typeface="Gautami"/>
+        <a:font script="Taml" typeface="Latha"/>
+        <a:font script="Syrc" typeface="Estrangelo Edessa"/>
+        <a:font script="Orya" typeface="Kalinga"/>
+        <a:font script="Mlym" typeface="Kartika"/>
+        <a:font script="Laoo" typeface="DokChampa"/>
+        <a:font script="Sinh" typeface="Iskoola Pota"/>
+        <a:font script="Mong" typeface="Mongolian Baiti"/>
+        <a:font script="Viet" typeface="Arial"/>
+        <a:font script="Uigh" typeface="Microsoft Uighur"/>
+        <a:font script="Geor" typeface="Sylfaen"/>
+        <a:font script="Armn" typeface="Arial"/>
+        <a:font script="Bugi" typeface="Leelawadee UI"/>
+        <a:font script="Bopo" typeface="Microsoft JhengHei"/>
+        <a:font script="Java" typeface="Javanese Text"/>
+        <a:font script="Lisu" typeface="Segoe UI"/>
+        <a:font script="Mymr" typeface="Myanmar Text"/>
+        <a:font script="Nkoo" typeface="Ebrima"/>
+        <a:font script="Olck" typeface="Nirmala UI"/>
+        <a:font script="Osma" typeface="Ebrima"/>
+        <a:font script="Phag" typeface="Phagspa"/>
+        <a:font script="Syrn" typeface="Estrangelo Edessa"/>
+        <a:font script="Syrj" typeface="Estrangelo Edessa"/>
+        <a:font script="Syre" typeface="Estrangelo Edessa"/>
+        <a:font script="Sora" typeface="Nirmala UI"/>
+        <a:font script="Tale" typeface="Microsoft Tai Le"/>
+        <a:font script="Talu" typeface="Microsoft New Tai Lue"/>
+        <a:font script="Tfng" typeface="Ebrima"/>
+      </a:minorFont>
+    </a:fontScheme>
+    <a:fmtScheme name="Office">
+      <a:fillStyleLst>
+        <a:solidFill>
+          <a:schemeClr val="phClr"/>
+        </a:solidFill>
+        <a:gradFill rotWithShape="1">
+          <a:gsLst>
+            <a:gs pos="0">
+              <a:schemeClr val="phClr">
+                <a:lumMod val="110000"/>
+                <a:satMod val="105000"/>
+                <a:tint val="67000"/>
+              </a:schemeClr>
+            </a:gs>
+            <a:gs pos="50000">
+              <a:schemeClr val="phClr">
+                <a:lumMod val="105000"/>
+                <a:satMod val="103000"/>
+                <a:tint val="73000"/>
+              </a:schemeClr>
+            </a:gs>
+            <a:gs pos="100000">
+              <a:schemeClr val="phClr">
+                <a:lumMod val="105000"/>
+                <a:satMod val="109000"/>
+                <a:tint val="81000"/>
+              </a:schemeClr>
+            </a:gs>
+          </a:gsLst>
+          <a:lin ang="5400000" scaled="0"/>
+        </a:gradFill>
+        <a:gradFill rotWithShape="1">
+          <a:gsLst>
+            <a:gs pos="0">
+              <a:schemeClr val="phClr">
+                <a:satMod val="103000"/>
+                <a:lumMod val="102000"/>
+                <a:tint val="94000"/>
+              </a:schemeClr>
+            </a:gs>
+            <a:gs pos="50000">
+              <a:schemeClr val="phClr">
+                <a:satMod val="110000"/>
+                <a:lumMod val="100000"/>
+                <a:shade val="100000"/>
+              </a:schemeClr>
+            </a:gs>
+            <a:gs pos="100000">
+              <a:schemeClr val="phClr">
+                <a:lumMod val="99000"/>
+                <a:satMod val="120000"/>
+                <a:shade val="78000"/>
+              </a:schemeClr>
+            </a:gs>
+          </a:gsLst>
+          <a:lin ang="5400000" scaled="0"/>
+        </a:gradFill>
+      </a:fillStyleLst>
+      <a:lnStyleLst>
+        <a:ln w="6350" cap="flat" cmpd="sng" algn="ctr">
+          <a:solidFill>
+            <a:schemeClr val="phClr"/>
+          </a:solidFill>
+          <a:prstDash val="solid"/>
+          <a:miter lim="800000"/>
+        </a:ln>
+        <a:ln w="12700" cap="flat" cmpd="sng" algn="ctr">
+          <a:solidFill>
+            <a:schemeClr val="phClr"/>
+          </a:solidFill>
+          <a:prstDash val="solid"/>
+          <a:miter lim="800000"/>
+        </a:ln>
+        <a:ln w="19050" cap="flat" cmpd="sng" algn="ctr">
+          <a:solidFill>
+            <a:schemeClr val="phClr"/>
+          </a:solidFill>
+          <a:prstDash val="solid"/>
+          <a:miter lim="800000"/>
+        </a:ln>
+      </a:lnStyleLst>
+      <a:effectStyleLst>
+        <a:effectStyle>
+          <a:effectLst/>
+        </a:effectStyle>
+        <a:effectStyle>
+          <a:effectLst/>
+        </a:effectStyle>
+        <a:effectStyle>
+          <a:effectLst>
+            <a:outerShdw blurRad="57150" dist="19050" dir="5400000" algn="ctr" rotWithShape="0">
+              <a:srgbClr val="000000">
+                <a:alpha val="63000"/>
+              </a:srgbClr>
+            </a:outerShdw>
+          </a:effectLst>
+        </a:effectStyle>
+      </a:effectStyleLst>
+      <a:bgFillStyleLst>
+        <a:solidFill>
+          <a:schemeClr val="phClr"/>
+        </a:solidFill>
+        <a:solidFill>
+          <a:schemeClr val="phClr">
+            <a:tint val="95000"/>
+            <a:satMod val="170000"/>
+          </a:schemeClr>
+        </a:solidFill>
+        <a:gradFill rotWithShape="1">
+          <a:gsLst>
+            <a:gs pos="0">
+              <a:schemeClr val="phClr">
+                <a:tint val="93000"/>
+                <a:satMod val="150000"/>
+                <a:shade val="98000"/>
+                <a:lumMod val="102000"/>
+              </a:schemeClr>
+            </a:gs>
+            <a:gs pos="50000">
+              <a:schemeClr val="phClr">
+                <a:tint val="98000"/>
+                <a:satMod val="130000"/>
+                <a:shade val="90000"/>
+                <a:lumMod val="103000"/>
+              </a:schemeClr>
+            </a:gs>
+            <a:gs pos="100000">
+              <a:schemeClr val="phClr">
+                <a:shade val="63000"/>
+                <a:satMod val="120000"/>
+              </a:schemeClr>
+            </a:gs>
+          </a:gsLst>
+          <a:lin ang="5400000" scaled="0"/>
+        </a:gradFill>
+      </a:bgFillStyleLst>
+    </a:fmtScheme>
+  </a:themeElements>
+  <a:objectDefaults/>
+  <a:extraClrSchemeLst/>
+  <a:extLst>
+    <a:ext uri="{05A4C25C-085E-4340-85A3-A5531E510DB2}">
+      <thm15:themeFamily xmlns:thm15="http://schemas.microsoft.com/office/thememl/2012/main" name="Office Theme" id="{62F939B6-93AF-4DB8-9C6B-D6C7DFDC589F}" vid="{4A3C46E8-61CC-4603-A589-7422A47A8E4A}"/>
+    </a:ext>
+  </a:extLst>
+</a:theme>
 </file>
</xml_diff>